<commit_message>
Added raw bawling game example
</commit_message>
<xml_diff>
--- a/12.UnitTests/UnitTests.pptx
+++ b/12.UnitTests/UnitTests.pptx
@@ -5,36 +5,37 @@
     <p:sldMasterId id="2147483661" r:id="rId1"/>
   </p:sldMasterIdLst>
   <p:notesMasterIdLst>
-    <p:notesMasterId r:id="rId12"/>
+    <p:notesMasterId r:id="rId13"/>
   </p:notesMasterIdLst>
   <p:sldIdLst>
     <p:sldId id="256" r:id="rId2"/>
     <p:sldId id="268" r:id="rId3"/>
     <p:sldId id="269" r:id="rId4"/>
     <p:sldId id="270" r:id="rId5"/>
-    <p:sldId id="272" r:id="rId6"/>
-    <p:sldId id="273" r:id="rId7"/>
-    <p:sldId id="275" r:id="rId8"/>
-    <p:sldId id="277" r:id="rId9"/>
-    <p:sldId id="278" r:id="rId10"/>
-    <p:sldId id="276" r:id="rId11"/>
+    <p:sldId id="279" r:id="rId6"/>
+    <p:sldId id="272" r:id="rId7"/>
+    <p:sldId id="273" r:id="rId8"/>
+    <p:sldId id="275" r:id="rId9"/>
+    <p:sldId id="277" r:id="rId10"/>
+    <p:sldId id="278" r:id="rId11"/>
+    <p:sldId id="276" r:id="rId12"/>
   </p:sldIdLst>
   <p:sldSz cx="9144000" cy="6858000" type="screen4x3"/>
   <p:notesSz cx="6858000" cy="9144000"/>
   <p:embeddedFontLst>
     <p:embeddedFont>
       <p:font typeface="Calibri" panose="020F0502020204030204" pitchFamily="34" charset="0"/>
-      <p:regular r:id="rId13"/>
-      <p:bold r:id="rId14"/>
-      <p:italic r:id="rId15"/>
-      <p:boldItalic r:id="rId16"/>
+      <p:regular r:id="rId14"/>
+      <p:bold r:id="rId15"/>
+      <p:italic r:id="rId16"/>
+      <p:boldItalic r:id="rId17"/>
     </p:embeddedFont>
     <p:embeddedFont>
       <p:font typeface="Roboto" panose="020B0604020202020204" charset="0"/>
-      <p:regular r:id="rId17"/>
-      <p:bold r:id="rId18"/>
-      <p:italic r:id="rId19"/>
-      <p:boldItalic r:id="rId20"/>
+      <p:regular r:id="rId18"/>
+      <p:bold r:id="rId19"/>
+      <p:italic r:id="rId20"/>
+      <p:boldItalic r:id="rId21"/>
     </p:embeddedFont>
   </p:embeddedFontLst>
   <p:defaultTextStyle>
@@ -1666,6 +1667,199 @@
     </p:spTree>
     <p:extLst>
       <p:ext uri="{BB962C8B-B14F-4D97-AF65-F5344CB8AC3E}">
+        <p14:creationId xmlns:p14="http://schemas.microsoft.com/office/powerpoint/2010/main" val="3701418762"/>
+      </p:ext>
+    </p:extLst>
+  </p:cSld>
+  <p:clrMapOvr>
+    <a:masterClrMapping/>
+  </p:clrMapOvr>
+</p:notes>
+</file>
+
+<file path=ppt/notesSlides/notesSlide11.xml><?xml version="1.0" encoding="utf-8"?>
+<p:notes xmlns:a="http://schemas.openxmlformats.org/drawingml/2006/main" xmlns:r="http://schemas.openxmlformats.org/officeDocument/2006/relationships" xmlns:p="http://schemas.openxmlformats.org/presentationml/2006/main" showMasterSp="0" showMasterPhAnim="0">
+  <p:cSld>
+    <p:spTree>
+      <p:nvGrpSpPr>
+        <p:cNvPr id="1" name="Shape 152"/>
+        <p:cNvGrpSpPr/>
+        <p:nvPr/>
+      </p:nvGrpSpPr>
+      <p:grpSpPr>
+        <a:xfrm>
+          <a:off x="0" y="0"/>
+          <a:ext cx="0" cy="0"/>
+          <a:chOff x="0" y="0"/>
+          <a:chExt cx="0" cy="0"/>
+        </a:xfrm>
+      </p:grpSpPr>
+      <p:sp>
+        <p:nvSpPr>
+          <p:cNvPr id="153" name="Shape 153"/>
+          <p:cNvSpPr>
+            <a:spLocks noGrp="1" noRot="1" noChangeAspect="1"/>
+          </p:cNvSpPr>
+          <p:nvPr>
+            <p:ph type="sldImg" idx="2"/>
+          </p:nvPr>
+        </p:nvSpPr>
+        <p:spPr>
+          <a:xfrm>
+            <a:off x="1143000" y="685800"/>
+            <a:ext cx="4572000" cy="3429000"/>
+          </a:xfrm>
+          <a:custGeom>
+            <a:avLst/>
+            <a:gdLst/>
+            <a:ahLst/>
+            <a:cxnLst/>
+            <a:rect l="0" t="0" r="0" b="0"/>
+            <a:pathLst>
+              <a:path w="120000" h="120000" extrusionOk="0">
+                <a:moveTo>
+                  <a:pt x="0" y="0"/>
+                </a:moveTo>
+                <a:lnTo>
+                  <a:pt x="120000" y="0"/>
+                </a:lnTo>
+                <a:lnTo>
+                  <a:pt x="120000" y="120000"/>
+                </a:lnTo>
+                <a:lnTo>
+                  <a:pt x="0" y="120000"/>
+                </a:lnTo>
+                <a:close/>
+              </a:path>
+            </a:pathLst>
+          </a:custGeom>
+          <a:noFill/>
+          <a:ln w="9525" cap="flat" cmpd="sng">
+            <a:solidFill>
+              <a:srgbClr val="000000"/>
+            </a:solidFill>
+            <a:prstDash val="solid"/>
+            <a:miter lim="800000"/>
+            <a:headEnd type="none" w="med" len="med"/>
+            <a:tailEnd type="none" w="med" len="med"/>
+          </a:ln>
+        </p:spPr>
+      </p:sp>
+      <p:sp>
+        <p:nvSpPr>
+          <p:cNvPr id="154" name="Shape 154"/>
+          <p:cNvSpPr txBox="1">
+            <a:spLocks noGrp="1"/>
+          </p:cNvSpPr>
+          <p:nvPr>
+            <p:ph type="body" idx="1"/>
+          </p:nvPr>
+        </p:nvSpPr>
+        <p:spPr>
+          <a:xfrm>
+            <a:off x="685800" y="4343400"/>
+            <a:ext cx="5486400" cy="4114800"/>
+          </a:xfrm>
+          <a:prstGeom prst="rect">
+            <a:avLst/>
+          </a:prstGeom>
+          <a:noFill/>
+          <a:ln>
+            <a:noFill/>
+          </a:ln>
+        </p:spPr>
+        <p:txBody>
+          <a:bodyPr spcFirstLastPara="1" wrap="square" lIns="91425" tIns="45700" rIns="91425" bIns="45700" anchor="t" anchorCtr="0">
+            <a:noAutofit/>
+          </a:bodyPr>
+          <a:lstStyle/>
+          <a:p>
+            <a:pPr marL="0" marR="0" lvl="0" indent="0" algn="l" rtl="0">
+              <a:spcBef>
+                <a:spcPts val="0"/>
+              </a:spcBef>
+              <a:spcAft>
+                <a:spcPts val="0"/>
+              </a:spcAft>
+              <a:buNone/>
+            </a:pPr>
+            <a:endParaRPr sz="1200" b="0" i="0" u="none" strike="noStrike" cap="none" dirty="0">
+              <a:solidFill>
+                <a:schemeClr val="dk1"/>
+              </a:solidFill>
+              <a:latin typeface="Calibri"/>
+              <a:ea typeface="Calibri"/>
+              <a:cs typeface="Calibri"/>
+              <a:sym typeface="Calibri"/>
+            </a:endParaRPr>
+          </a:p>
+        </p:txBody>
+      </p:sp>
+      <p:sp>
+        <p:nvSpPr>
+          <p:cNvPr id="155" name="Shape 155"/>
+          <p:cNvSpPr txBox="1">
+            <a:spLocks noGrp="1"/>
+          </p:cNvSpPr>
+          <p:nvPr>
+            <p:ph type="sldNum" idx="12"/>
+          </p:nvPr>
+        </p:nvSpPr>
+        <p:spPr>
+          <a:xfrm>
+            <a:off x="3884613" y="8685213"/>
+            <a:ext cx="2971800" cy="457200"/>
+          </a:xfrm>
+          <a:prstGeom prst="rect">
+            <a:avLst/>
+          </a:prstGeom>
+          <a:noFill/>
+          <a:ln>
+            <a:noFill/>
+          </a:ln>
+        </p:spPr>
+        <p:txBody>
+          <a:bodyPr spcFirstLastPara="1" wrap="square" lIns="91425" tIns="45700" rIns="91425" bIns="45700" anchor="b" anchorCtr="0">
+            <a:noAutofit/>
+          </a:bodyPr>
+          <a:lstStyle/>
+          <a:p>
+            <a:pPr marL="0" marR="0" lvl="0" indent="0" algn="r" rtl="0">
+              <a:spcBef>
+                <a:spcPts val="0"/>
+              </a:spcBef>
+              <a:spcAft>
+                <a:spcPts val="0"/>
+              </a:spcAft>
+              <a:buNone/>
+            </a:pPr>
+            <a:fld id="{00000000-1234-1234-1234-123412341234}" type="slidenum">
+              <a:rPr lang="en-US" sz="1200" b="0" i="0" u="none" strike="noStrike" cap="none">
+                <a:solidFill>
+                  <a:schemeClr val="dk1"/>
+                </a:solidFill>
+                <a:latin typeface="Calibri"/>
+                <a:ea typeface="Calibri"/>
+                <a:cs typeface="Calibri"/>
+                <a:sym typeface="Calibri"/>
+              </a:rPr>
+              <a:t>11</a:t>
+            </a:fld>
+            <a:endParaRPr sz="1200" b="0" i="0" u="none" strike="noStrike" cap="none">
+              <a:solidFill>
+                <a:schemeClr val="dk1"/>
+              </a:solidFill>
+              <a:latin typeface="Calibri"/>
+              <a:ea typeface="Calibri"/>
+              <a:cs typeface="Calibri"/>
+              <a:sym typeface="Calibri"/>
+            </a:endParaRPr>
+          </a:p>
+        </p:txBody>
+      </p:sp>
+    </p:spTree>
+    <p:extLst>
+      <p:ext uri="{BB962C8B-B14F-4D97-AF65-F5344CB8AC3E}">
         <p14:creationId xmlns:p14="http://schemas.microsoft.com/office/powerpoint/2010/main" val="1023435651"/>
       </p:ext>
     </p:extLst>
@@ -2279,6 +2473,199 @@
   <p:cSld>
     <p:spTree>
       <p:nvGrpSpPr>
+        <p:cNvPr id="1" name="Shape 152"/>
+        <p:cNvGrpSpPr/>
+        <p:nvPr/>
+      </p:nvGrpSpPr>
+      <p:grpSpPr>
+        <a:xfrm>
+          <a:off x="0" y="0"/>
+          <a:ext cx="0" cy="0"/>
+          <a:chOff x="0" y="0"/>
+          <a:chExt cx="0" cy="0"/>
+        </a:xfrm>
+      </p:grpSpPr>
+      <p:sp>
+        <p:nvSpPr>
+          <p:cNvPr id="153" name="Shape 153"/>
+          <p:cNvSpPr>
+            <a:spLocks noGrp="1" noRot="1" noChangeAspect="1"/>
+          </p:cNvSpPr>
+          <p:nvPr>
+            <p:ph type="sldImg" idx="2"/>
+          </p:nvPr>
+        </p:nvSpPr>
+        <p:spPr>
+          <a:xfrm>
+            <a:off x="1143000" y="685800"/>
+            <a:ext cx="4572000" cy="3429000"/>
+          </a:xfrm>
+          <a:custGeom>
+            <a:avLst/>
+            <a:gdLst/>
+            <a:ahLst/>
+            <a:cxnLst/>
+            <a:rect l="0" t="0" r="0" b="0"/>
+            <a:pathLst>
+              <a:path w="120000" h="120000" extrusionOk="0">
+                <a:moveTo>
+                  <a:pt x="0" y="0"/>
+                </a:moveTo>
+                <a:lnTo>
+                  <a:pt x="120000" y="0"/>
+                </a:lnTo>
+                <a:lnTo>
+                  <a:pt x="120000" y="120000"/>
+                </a:lnTo>
+                <a:lnTo>
+                  <a:pt x="0" y="120000"/>
+                </a:lnTo>
+                <a:close/>
+              </a:path>
+            </a:pathLst>
+          </a:custGeom>
+          <a:noFill/>
+          <a:ln w="9525" cap="flat" cmpd="sng">
+            <a:solidFill>
+              <a:srgbClr val="000000"/>
+            </a:solidFill>
+            <a:prstDash val="solid"/>
+            <a:miter lim="800000"/>
+            <a:headEnd type="none" w="med" len="med"/>
+            <a:tailEnd type="none" w="med" len="med"/>
+          </a:ln>
+        </p:spPr>
+      </p:sp>
+      <p:sp>
+        <p:nvSpPr>
+          <p:cNvPr id="154" name="Shape 154"/>
+          <p:cNvSpPr txBox="1">
+            <a:spLocks noGrp="1"/>
+          </p:cNvSpPr>
+          <p:nvPr>
+            <p:ph type="body" idx="1"/>
+          </p:nvPr>
+        </p:nvSpPr>
+        <p:spPr>
+          <a:xfrm>
+            <a:off x="685800" y="4343400"/>
+            <a:ext cx="5486400" cy="4114800"/>
+          </a:xfrm>
+          <a:prstGeom prst="rect">
+            <a:avLst/>
+          </a:prstGeom>
+          <a:noFill/>
+          <a:ln>
+            <a:noFill/>
+          </a:ln>
+        </p:spPr>
+        <p:txBody>
+          <a:bodyPr spcFirstLastPara="1" wrap="square" lIns="91425" tIns="45700" rIns="91425" bIns="45700" anchor="t" anchorCtr="0">
+            <a:noAutofit/>
+          </a:bodyPr>
+          <a:lstStyle/>
+          <a:p>
+            <a:pPr marL="0" marR="0" lvl="0" indent="0" algn="l" rtl="0">
+              <a:spcBef>
+                <a:spcPts val="0"/>
+              </a:spcBef>
+              <a:spcAft>
+                <a:spcPts val="0"/>
+              </a:spcAft>
+              <a:buNone/>
+            </a:pPr>
+            <a:endParaRPr sz="1200" b="0" i="0" u="none" strike="noStrike" cap="none" dirty="0">
+              <a:solidFill>
+                <a:schemeClr val="dk1"/>
+              </a:solidFill>
+              <a:latin typeface="Calibri"/>
+              <a:ea typeface="Calibri"/>
+              <a:cs typeface="Calibri"/>
+              <a:sym typeface="Calibri"/>
+            </a:endParaRPr>
+          </a:p>
+        </p:txBody>
+      </p:sp>
+      <p:sp>
+        <p:nvSpPr>
+          <p:cNvPr id="155" name="Shape 155"/>
+          <p:cNvSpPr txBox="1">
+            <a:spLocks noGrp="1"/>
+          </p:cNvSpPr>
+          <p:nvPr>
+            <p:ph type="sldNum" idx="12"/>
+          </p:nvPr>
+        </p:nvSpPr>
+        <p:spPr>
+          <a:xfrm>
+            <a:off x="3884613" y="8685213"/>
+            <a:ext cx="2971800" cy="457200"/>
+          </a:xfrm>
+          <a:prstGeom prst="rect">
+            <a:avLst/>
+          </a:prstGeom>
+          <a:noFill/>
+          <a:ln>
+            <a:noFill/>
+          </a:ln>
+        </p:spPr>
+        <p:txBody>
+          <a:bodyPr spcFirstLastPara="1" wrap="square" lIns="91425" tIns="45700" rIns="91425" bIns="45700" anchor="b" anchorCtr="0">
+            <a:noAutofit/>
+          </a:bodyPr>
+          <a:lstStyle/>
+          <a:p>
+            <a:pPr marL="0" marR="0" lvl="0" indent="0" algn="r" rtl="0">
+              <a:spcBef>
+                <a:spcPts val="0"/>
+              </a:spcBef>
+              <a:spcAft>
+                <a:spcPts val="0"/>
+              </a:spcAft>
+              <a:buNone/>
+            </a:pPr>
+            <a:fld id="{00000000-1234-1234-1234-123412341234}" type="slidenum">
+              <a:rPr lang="en-US" sz="1200" b="0" i="0" u="none" strike="noStrike" cap="none">
+                <a:solidFill>
+                  <a:schemeClr val="dk1"/>
+                </a:solidFill>
+                <a:latin typeface="Calibri"/>
+                <a:ea typeface="Calibri"/>
+                <a:cs typeface="Calibri"/>
+                <a:sym typeface="Calibri"/>
+              </a:rPr>
+              <a:t>5</a:t>
+            </a:fld>
+            <a:endParaRPr sz="1200" b="0" i="0" u="none" strike="noStrike" cap="none">
+              <a:solidFill>
+                <a:schemeClr val="dk1"/>
+              </a:solidFill>
+              <a:latin typeface="Calibri"/>
+              <a:ea typeface="Calibri"/>
+              <a:cs typeface="Calibri"/>
+              <a:sym typeface="Calibri"/>
+            </a:endParaRPr>
+          </a:p>
+        </p:txBody>
+      </p:sp>
+    </p:spTree>
+    <p:extLst>
+      <p:ext uri="{BB962C8B-B14F-4D97-AF65-F5344CB8AC3E}">
+        <p14:creationId xmlns:p14="http://schemas.microsoft.com/office/powerpoint/2010/main" val="2923119932"/>
+      </p:ext>
+    </p:extLst>
+  </p:cSld>
+  <p:clrMapOvr>
+    <a:masterClrMapping/>
+  </p:clrMapOvr>
+</p:notes>
+</file>
+
+<file path=ppt/notesSlides/notesSlide6.xml><?xml version="1.0" encoding="utf-8"?>
+<p:notes xmlns:a="http://schemas.openxmlformats.org/drawingml/2006/main" xmlns:r="http://schemas.openxmlformats.org/officeDocument/2006/relationships" xmlns:p="http://schemas.openxmlformats.org/presentationml/2006/main" showMasterSp="0" showMasterPhAnim="0">
+  <p:cSld>
+    <p:spTree>
+      <p:nvGrpSpPr>
         <p:cNvPr id="1" name="Shape 177"/>
         <p:cNvGrpSpPr/>
         <p:nvPr/>
@@ -2440,7 +2827,7 @@
                 <a:cs typeface="Calibri"/>
                 <a:sym typeface="Calibri"/>
               </a:rPr>
-              <a:t>5</a:t>
+              <a:t>6</a:t>
             </a:fld>
             <a:endParaRPr sz="1200" b="0" i="0" u="none" strike="noStrike" cap="none">
               <a:solidFill>
@@ -2467,7 +2854,7 @@
 </p:notes>
 </file>
 
-<file path=ppt/notesSlides/notesSlide6.xml><?xml version="1.0" encoding="utf-8"?>
+<file path=ppt/notesSlides/notesSlide7.xml><?xml version="1.0" encoding="utf-8"?>
 <p:notes xmlns:a="http://schemas.openxmlformats.org/drawingml/2006/main" xmlns:r="http://schemas.openxmlformats.org/officeDocument/2006/relationships" xmlns:p="http://schemas.openxmlformats.org/presentationml/2006/main" showMasterSp="0" showMasterPhAnim="0">
   <p:cSld>
     <p:spTree>
@@ -2633,7 +3020,7 @@
                 <a:cs typeface="Calibri"/>
                 <a:sym typeface="Calibri"/>
               </a:rPr>
-              <a:t>6</a:t>
+              <a:t>7</a:t>
             </a:fld>
             <a:endParaRPr sz="1200" b="0" i="0" u="none" strike="noStrike" cap="none">
               <a:solidFill>
@@ -2651,199 +3038,6 @@
     <p:extLst>
       <p:ext uri="{BB962C8B-B14F-4D97-AF65-F5344CB8AC3E}">
         <p14:creationId xmlns:p14="http://schemas.microsoft.com/office/powerpoint/2010/main" val="3265857183"/>
-      </p:ext>
-    </p:extLst>
-  </p:cSld>
-  <p:clrMapOvr>
-    <a:masterClrMapping/>
-  </p:clrMapOvr>
-</p:notes>
-</file>
-
-<file path=ppt/notesSlides/notesSlide7.xml><?xml version="1.0" encoding="utf-8"?>
-<p:notes xmlns:a="http://schemas.openxmlformats.org/drawingml/2006/main" xmlns:r="http://schemas.openxmlformats.org/officeDocument/2006/relationships" xmlns:p="http://schemas.openxmlformats.org/presentationml/2006/main" showMasterSp="0" showMasterPhAnim="0">
-  <p:cSld>
-    <p:spTree>
-      <p:nvGrpSpPr>
-        <p:cNvPr id="1" name="Shape 152"/>
-        <p:cNvGrpSpPr/>
-        <p:nvPr/>
-      </p:nvGrpSpPr>
-      <p:grpSpPr>
-        <a:xfrm>
-          <a:off x="0" y="0"/>
-          <a:ext cx="0" cy="0"/>
-          <a:chOff x="0" y="0"/>
-          <a:chExt cx="0" cy="0"/>
-        </a:xfrm>
-      </p:grpSpPr>
-      <p:sp>
-        <p:nvSpPr>
-          <p:cNvPr id="153" name="Shape 153"/>
-          <p:cNvSpPr>
-            <a:spLocks noGrp="1" noRot="1" noChangeAspect="1"/>
-          </p:cNvSpPr>
-          <p:nvPr>
-            <p:ph type="sldImg" idx="2"/>
-          </p:nvPr>
-        </p:nvSpPr>
-        <p:spPr>
-          <a:xfrm>
-            <a:off x="1143000" y="685800"/>
-            <a:ext cx="4572000" cy="3429000"/>
-          </a:xfrm>
-          <a:custGeom>
-            <a:avLst/>
-            <a:gdLst/>
-            <a:ahLst/>
-            <a:cxnLst/>
-            <a:rect l="0" t="0" r="0" b="0"/>
-            <a:pathLst>
-              <a:path w="120000" h="120000" extrusionOk="0">
-                <a:moveTo>
-                  <a:pt x="0" y="0"/>
-                </a:moveTo>
-                <a:lnTo>
-                  <a:pt x="120000" y="0"/>
-                </a:lnTo>
-                <a:lnTo>
-                  <a:pt x="120000" y="120000"/>
-                </a:lnTo>
-                <a:lnTo>
-                  <a:pt x="0" y="120000"/>
-                </a:lnTo>
-                <a:close/>
-              </a:path>
-            </a:pathLst>
-          </a:custGeom>
-          <a:noFill/>
-          <a:ln w="9525" cap="flat" cmpd="sng">
-            <a:solidFill>
-              <a:srgbClr val="000000"/>
-            </a:solidFill>
-            <a:prstDash val="solid"/>
-            <a:miter lim="800000"/>
-            <a:headEnd type="none" w="med" len="med"/>
-            <a:tailEnd type="none" w="med" len="med"/>
-          </a:ln>
-        </p:spPr>
-      </p:sp>
-      <p:sp>
-        <p:nvSpPr>
-          <p:cNvPr id="154" name="Shape 154"/>
-          <p:cNvSpPr txBox="1">
-            <a:spLocks noGrp="1"/>
-          </p:cNvSpPr>
-          <p:nvPr>
-            <p:ph type="body" idx="1"/>
-          </p:nvPr>
-        </p:nvSpPr>
-        <p:spPr>
-          <a:xfrm>
-            <a:off x="685800" y="4343400"/>
-            <a:ext cx="5486400" cy="4114800"/>
-          </a:xfrm>
-          <a:prstGeom prst="rect">
-            <a:avLst/>
-          </a:prstGeom>
-          <a:noFill/>
-          <a:ln>
-            <a:noFill/>
-          </a:ln>
-        </p:spPr>
-        <p:txBody>
-          <a:bodyPr spcFirstLastPara="1" wrap="square" lIns="91425" tIns="45700" rIns="91425" bIns="45700" anchor="t" anchorCtr="0">
-            <a:noAutofit/>
-          </a:bodyPr>
-          <a:lstStyle/>
-          <a:p>
-            <a:pPr marL="0" marR="0" lvl="0" indent="0" algn="l" rtl="0">
-              <a:spcBef>
-                <a:spcPts val="0"/>
-              </a:spcBef>
-              <a:spcAft>
-                <a:spcPts val="0"/>
-              </a:spcAft>
-              <a:buNone/>
-            </a:pPr>
-            <a:endParaRPr sz="1200" b="0" i="0" u="none" strike="noStrike" cap="none" dirty="0">
-              <a:solidFill>
-                <a:schemeClr val="dk1"/>
-              </a:solidFill>
-              <a:latin typeface="Calibri"/>
-              <a:ea typeface="Calibri"/>
-              <a:cs typeface="Calibri"/>
-              <a:sym typeface="Calibri"/>
-            </a:endParaRPr>
-          </a:p>
-        </p:txBody>
-      </p:sp>
-      <p:sp>
-        <p:nvSpPr>
-          <p:cNvPr id="155" name="Shape 155"/>
-          <p:cNvSpPr txBox="1">
-            <a:spLocks noGrp="1"/>
-          </p:cNvSpPr>
-          <p:nvPr>
-            <p:ph type="sldNum" idx="12"/>
-          </p:nvPr>
-        </p:nvSpPr>
-        <p:spPr>
-          <a:xfrm>
-            <a:off x="3884613" y="8685213"/>
-            <a:ext cx="2971800" cy="457200"/>
-          </a:xfrm>
-          <a:prstGeom prst="rect">
-            <a:avLst/>
-          </a:prstGeom>
-          <a:noFill/>
-          <a:ln>
-            <a:noFill/>
-          </a:ln>
-        </p:spPr>
-        <p:txBody>
-          <a:bodyPr spcFirstLastPara="1" wrap="square" lIns="91425" tIns="45700" rIns="91425" bIns="45700" anchor="b" anchorCtr="0">
-            <a:noAutofit/>
-          </a:bodyPr>
-          <a:lstStyle/>
-          <a:p>
-            <a:pPr marL="0" marR="0" lvl="0" indent="0" algn="r" rtl="0">
-              <a:spcBef>
-                <a:spcPts val="0"/>
-              </a:spcBef>
-              <a:spcAft>
-                <a:spcPts val="0"/>
-              </a:spcAft>
-              <a:buNone/>
-            </a:pPr>
-            <a:fld id="{00000000-1234-1234-1234-123412341234}" type="slidenum">
-              <a:rPr lang="en-US" sz="1200" b="0" i="0" u="none" strike="noStrike" cap="none">
-                <a:solidFill>
-                  <a:schemeClr val="dk1"/>
-                </a:solidFill>
-                <a:latin typeface="Calibri"/>
-                <a:ea typeface="Calibri"/>
-                <a:cs typeface="Calibri"/>
-                <a:sym typeface="Calibri"/>
-              </a:rPr>
-              <a:t>7</a:t>
-            </a:fld>
-            <a:endParaRPr sz="1200" b="0" i="0" u="none" strike="noStrike" cap="none">
-              <a:solidFill>
-                <a:schemeClr val="dk1"/>
-              </a:solidFill>
-              <a:latin typeface="Calibri"/>
-              <a:ea typeface="Calibri"/>
-              <a:cs typeface="Calibri"/>
-              <a:sym typeface="Calibri"/>
-            </a:endParaRPr>
-          </a:p>
-        </p:txBody>
-      </p:sp>
-    </p:spTree>
-    <p:extLst>
-      <p:ext uri="{BB962C8B-B14F-4D97-AF65-F5344CB8AC3E}">
-        <p14:creationId xmlns:p14="http://schemas.microsoft.com/office/powerpoint/2010/main" val="2198757574"/>
       </p:ext>
     </p:extLst>
   </p:cSld>
@@ -3036,7 +3230,7 @@
     </p:spTree>
     <p:extLst>
       <p:ext uri="{BB962C8B-B14F-4D97-AF65-F5344CB8AC3E}">
-        <p14:creationId xmlns:p14="http://schemas.microsoft.com/office/powerpoint/2010/main" val="620635695"/>
+        <p14:creationId xmlns:p14="http://schemas.microsoft.com/office/powerpoint/2010/main" val="2198757574"/>
       </p:ext>
     </p:extLst>
   </p:cSld>
@@ -3229,7 +3423,7 @@
     </p:spTree>
     <p:extLst>
       <p:ext uri="{BB962C8B-B14F-4D97-AF65-F5344CB8AC3E}">
-        <p14:creationId xmlns:p14="http://schemas.microsoft.com/office/powerpoint/2010/main" val="3701418762"/>
+        <p14:creationId xmlns:p14="http://schemas.microsoft.com/office/powerpoint/2010/main" val="620635695"/>
       </p:ext>
     </p:extLst>
   </p:cSld>
@@ -20394,6 +20588,547 @@
         </p:nvSpPr>
         <p:spPr>
           <a:xfrm>
+            <a:off x="443176" y="1116448"/>
+            <a:ext cx="8229600" cy="1143000"/>
+          </a:xfrm>
+          <a:prstGeom prst="rect">
+            <a:avLst/>
+          </a:prstGeom>
+          <a:noFill/>
+          <a:ln>
+            <a:noFill/>
+          </a:ln>
+        </p:spPr>
+        <p:txBody>
+          <a:bodyPr spcFirstLastPara="1" wrap="square" lIns="91425" tIns="45700" rIns="91425" bIns="45700" anchor="ctr" anchorCtr="0">
+            <a:noAutofit/>
+          </a:bodyPr>
+          <a:lstStyle/>
+          <a:p>
+            <a:pPr marL="0" marR="0" lvl="0" indent="0" algn="l" rtl="0">
+              <a:spcBef>
+                <a:spcPts val="0"/>
+              </a:spcBef>
+              <a:spcAft>
+                <a:spcPts val="0"/>
+              </a:spcAft>
+              <a:buClr>
+                <a:schemeClr val="dk1"/>
+              </a:buClr>
+              <a:buSzPts val="4400"/>
+              <a:buFont typeface="Calibri"/>
+              <a:buNone/>
+            </a:pPr>
+            <a:r>
+              <a:rPr lang="en-US" sz="4100" b="1" i="0" u="none" strike="noStrike" cap="none" dirty="0">
+                <a:solidFill>
+                  <a:srgbClr val="262626"/>
+                </a:solidFill>
+                <a:latin typeface="Roboto"/>
+                <a:ea typeface="Roboto"/>
+                <a:cs typeface="Roboto"/>
+                <a:sym typeface="Roboto"/>
+              </a:rPr>
+              <a:t>The Bowling Game Example</a:t>
+            </a:r>
+            <a:endParaRPr sz="4100" b="1" i="0" u="none" strike="noStrike" cap="none" dirty="0">
+              <a:solidFill>
+                <a:srgbClr val="262626"/>
+              </a:solidFill>
+              <a:latin typeface="Roboto"/>
+              <a:ea typeface="Roboto"/>
+              <a:cs typeface="Roboto"/>
+              <a:sym typeface="Roboto"/>
+            </a:endParaRPr>
+          </a:p>
+        </p:txBody>
+      </p:sp>
+      <p:sp>
+        <p:nvSpPr>
+          <p:cNvPr id="159" name="Shape 159"/>
+          <p:cNvSpPr/>
+          <p:nvPr/>
+        </p:nvSpPr>
+        <p:spPr>
+          <a:xfrm>
+            <a:off x="7145316" y="408237"/>
+            <a:ext cx="1856100" cy="290400"/>
+          </a:xfrm>
+          <a:prstGeom prst="roundRect">
+            <a:avLst>
+              <a:gd name="adj" fmla="val 0"/>
+            </a:avLst>
+          </a:prstGeom>
+          <a:noFill/>
+          <a:ln>
+            <a:noFill/>
+          </a:ln>
+        </p:spPr>
+        <p:txBody>
+          <a:bodyPr spcFirstLastPara="1" wrap="square" lIns="91425" tIns="45700" rIns="91425" bIns="45700" anchor="ctr" anchorCtr="0">
+            <a:noAutofit/>
+          </a:bodyPr>
+          <a:lstStyle/>
+          <a:p>
+            <a:pPr marL="0" marR="0" lvl="0" indent="0" algn="ctr" rtl="0">
+              <a:spcBef>
+                <a:spcPts val="0"/>
+              </a:spcBef>
+              <a:spcAft>
+                <a:spcPts val="0"/>
+              </a:spcAft>
+              <a:buClr>
+                <a:schemeClr val="lt1"/>
+              </a:buClr>
+              <a:buSzPts val="1200"/>
+              <a:buFont typeface="Arial"/>
+              <a:buNone/>
+            </a:pPr>
+            <a:r>
+              <a:rPr lang="en-US" sz="1500" b="1" i="0" strike="noStrike" cap="none">
+                <a:solidFill>
+                  <a:srgbClr val="262626"/>
+                </a:solidFill>
+                <a:latin typeface="Roboto"/>
+                <a:ea typeface="Roboto"/>
+                <a:cs typeface="Roboto"/>
+                <a:sym typeface="Roboto"/>
+              </a:rPr>
+              <a:t>www.itea.ua</a:t>
+            </a:r>
+            <a:endParaRPr sz="1500" b="1" i="0" strike="noStrike" cap="none">
+              <a:solidFill>
+                <a:srgbClr val="262626"/>
+              </a:solidFill>
+              <a:latin typeface="Roboto"/>
+              <a:ea typeface="Roboto"/>
+              <a:cs typeface="Roboto"/>
+              <a:sym typeface="Roboto"/>
+            </a:endParaRPr>
+          </a:p>
+        </p:txBody>
+      </p:sp>
+      <p:sp>
+        <p:nvSpPr>
+          <p:cNvPr id="160" name="Shape 160"/>
+          <p:cNvSpPr/>
+          <p:nvPr/>
+        </p:nvSpPr>
+        <p:spPr>
+          <a:xfrm rot="10800000" flipH="1">
+            <a:off x="0" y="1127850"/>
+            <a:ext cx="3143100" cy="42300"/>
+          </a:xfrm>
+          <a:prstGeom prst="rect">
+            <a:avLst/>
+          </a:prstGeom>
+          <a:solidFill>
+            <a:srgbClr val="CC0000"/>
+          </a:solidFill>
+          <a:ln>
+            <a:noFill/>
+          </a:ln>
+        </p:spPr>
+        <p:txBody>
+          <a:bodyPr spcFirstLastPara="1" wrap="square" lIns="91425" tIns="91425" rIns="91425" bIns="91425" anchor="ctr" anchorCtr="0">
+            <a:noAutofit/>
+          </a:bodyPr>
+          <a:lstStyle/>
+          <a:p>
+            <a:pPr marL="0" lvl="0" indent="0">
+              <a:spcBef>
+                <a:spcPts val="0"/>
+              </a:spcBef>
+              <a:spcAft>
+                <a:spcPts val="0"/>
+              </a:spcAft>
+              <a:buNone/>
+            </a:pPr>
+            <a:r>
+              <a:rPr lang="en-US"/>
+              <a:t>                                                                                     </a:t>
+            </a:r>
+            <a:endParaRPr/>
+          </a:p>
+        </p:txBody>
+      </p:sp>
+      <p:sp>
+        <p:nvSpPr>
+          <p:cNvPr id="161" name="Shape 161"/>
+          <p:cNvSpPr/>
+          <p:nvPr/>
+        </p:nvSpPr>
+        <p:spPr>
+          <a:xfrm rot="10800000" flipH="1">
+            <a:off x="3067050" y="1127850"/>
+            <a:ext cx="3143100" cy="42300"/>
+          </a:xfrm>
+          <a:prstGeom prst="rect">
+            <a:avLst/>
+          </a:prstGeom>
+          <a:solidFill>
+            <a:srgbClr val="262626"/>
+          </a:solidFill>
+          <a:ln>
+            <a:noFill/>
+          </a:ln>
+        </p:spPr>
+        <p:txBody>
+          <a:bodyPr spcFirstLastPara="1" wrap="square" lIns="91425" tIns="91425" rIns="91425" bIns="91425" anchor="ctr" anchorCtr="0">
+            <a:noAutofit/>
+          </a:bodyPr>
+          <a:lstStyle/>
+          <a:p>
+            <a:pPr marL="0" lvl="0" indent="0">
+              <a:spcBef>
+                <a:spcPts val="0"/>
+              </a:spcBef>
+              <a:spcAft>
+                <a:spcPts val="0"/>
+              </a:spcAft>
+              <a:buNone/>
+            </a:pPr>
+            <a:endParaRPr/>
+          </a:p>
+        </p:txBody>
+      </p:sp>
+      <p:pic>
+        <p:nvPicPr>
+          <p:cNvPr id="162" name="Shape 162"/>
+          <p:cNvPicPr preferRelativeResize="0"/>
+          <p:nvPr/>
+        </p:nvPicPr>
+        <p:blipFill>
+          <a:blip r:embed="rId3">
+            <a:alphaModFix/>
+          </a:blip>
+          <a:stretch>
+            <a:fillRect/>
+          </a:stretch>
+        </p:blipFill>
+        <p:spPr>
+          <a:xfrm>
+            <a:off x="353700" y="302000"/>
+            <a:ext cx="1741800" cy="502875"/>
+          </a:xfrm>
+          <a:prstGeom prst="rect">
+            <a:avLst/>
+          </a:prstGeom>
+          <a:noFill/>
+          <a:ln>
+            <a:noFill/>
+          </a:ln>
+        </p:spPr>
+      </p:pic>
+      <p:pic>
+        <p:nvPicPr>
+          <p:cNvPr id="1026" name="Picture 2" descr="GitHub - hontas/bowling-game-kata: Uncle Bob's Bowling Game Kata in  JavaScript using Karma, Mocha and Chai">
+            <a:extLst>
+              <a:ext uri="{FF2B5EF4-FFF2-40B4-BE49-F238E27FC236}">
+                <a16:creationId xmlns:a16="http://schemas.microsoft.com/office/drawing/2014/main" id="{BB8B07B5-1158-40D5-B5C8-8CF31C5D3577}"/>
+              </a:ext>
+            </a:extLst>
+          </p:cNvPr>
+          <p:cNvPicPr>
+            <a:picLocks noChangeAspect="1" noChangeArrowheads="1"/>
+          </p:cNvPicPr>
+          <p:nvPr/>
+        </p:nvPicPr>
+        <p:blipFill>
+          <a:blip r:embed="rId4">
+            <a:extLst>
+              <a:ext uri="{28A0092B-C50C-407E-A947-70E740481C1C}">
+                <a14:useLocalDpi xmlns:a14="http://schemas.microsoft.com/office/drawing/2010/main" val="0"/>
+              </a:ext>
+            </a:extLst>
+          </a:blip>
+          <a:srcRect/>
+          <a:stretch>
+            <a:fillRect/>
+          </a:stretch>
+        </p:blipFill>
+        <p:spPr bwMode="auto">
+          <a:xfrm>
+            <a:off x="53266" y="5362663"/>
+            <a:ext cx="9037468" cy="1173616"/>
+          </a:xfrm>
+          <a:prstGeom prst="rect">
+            <a:avLst/>
+          </a:prstGeom>
+          <a:noFill/>
+          <a:extLst>
+            <a:ext uri="{909E8E84-426E-40DD-AFC4-6F175D3DCCD1}">
+              <a14:hiddenFill xmlns:a14="http://schemas.microsoft.com/office/drawing/2010/main">
+                <a:solidFill>
+                  <a:srgbClr val="FFFFFF"/>
+                </a:solidFill>
+              </a14:hiddenFill>
+            </a:ext>
+          </a:extLst>
+        </p:spPr>
+      </p:pic>
+      <p:sp>
+        <p:nvSpPr>
+          <p:cNvPr id="9" name="Shape 163">
+            <a:extLst>
+              <a:ext uri="{FF2B5EF4-FFF2-40B4-BE49-F238E27FC236}">
+                <a16:creationId xmlns:a16="http://schemas.microsoft.com/office/drawing/2014/main" id="{B8D05A87-8A10-492F-AD74-0C93BD6D5053}"/>
+              </a:ext>
+            </a:extLst>
+          </p:cNvPr>
+          <p:cNvSpPr txBox="1"/>
+          <p:nvPr/>
+        </p:nvSpPr>
+        <p:spPr>
+          <a:xfrm>
+            <a:off x="353700" y="2166152"/>
+            <a:ext cx="8181300" cy="2032986"/>
+          </a:xfrm>
+          <a:prstGeom prst="rect">
+            <a:avLst/>
+          </a:prstGeom>
+          <a:noFill/>
+          <a:ln>
+            <a:noFill/>
+          </a:ln>
+        </p:spPr>
+        <p:txBody>
+          <a:bodyPr spcFirstLastPara="1" wrap="square" lIns="91425" tIns="45700" rIns="91425" bIns="45700" anchor="ctr" anchorCtr="0">
+            <a:noAutofit/>
+          </a:bodyPr>
+          <a:lstStyle/>
+          <a:p>
+            <a:pPr lvl="0">
+              <a:spcAft>
+                <a:spcPts val="2500"/>
+              </a:spcAft>
+              <a:buSzPts val="2000"/>
+            </a:pPr>
+            <a:r>
+              <a:rPr lang="ru-RU" sz="2000" dirty="0">
+                <a:solidFill>
+                  <a:srgbClr val="262626"/>
+                </a:solidFill>
+                <a:latin typeface="Roboto"/>
+                <a:ea typeface="Roboto"/>
+                <a:cs typeface="Roboto"/>
+                <a:sym typeface="Roboto"/>
+              </a:rPr>
+              <a:t>Руководствуясь методикой </a:t>
+            </a:r>
+            <a:r>
+              <a:rPr lang="en-US" sz="2000" dirty="0">
+                <a:solidFill>
+                  <a:srgbClr val="262626"/>
+                </a:solidFill>
+                <a:latin typeface="Roboto"/>
+                <a:ea typeface="Roboto"/>
+                <a:cs typeface="Roboto"/>
+                <a:sym typeface="Roboto"/>
+              </a:rPr>
+              <a:t>TDD</a:t>
+            </a:r>
+            <a:r>
+              <a:rPr lang="ru-RU" sz="2000" dirty="0">
+                <a:solidFill>
+                  <a:srgbClr val="262626"/>
+                </a:solidFill>
+                <a:latin typeface="Roboto"/>
+                <a:ea typeface="Roboto"/>
+                <a:cs typeface="Roboto"/>
+                <a:sym typeface="Roboto"/>
+              </a:rPr>
+              <a:t>,</a:t>
+            </a:r>
+            <a:r>
+              <a:rPr lang="en-US" sz="2000" dirty="0">
+                <a:solidFill>
+                  <a:srgbClr val="262626"/>
+                </a:solidFill>
+                <a:latin typeface="Roboto"/>
+                <a:ea typeface="Roboto"/>
+                <a:cs typeface="Roboto"/>
+                <a:sym typeface="Roboto"/>
+              </a:rPr>
+              <a:t> </a:t>
+            </a:r>
+            <a:r>
+              <a:rPr lang="ru-RU" sz="2000" dirty="0">
+                <a:solidFill>
+                  <a:srgbClr val="262626"/>
+                </a:solidFill>
+                <a:latin typeface="Roboto"/>
+                <a:ea typeface="Roboto"/>
+                <a:cs typeface="Roboto"/>
+                <a:sym typeface="Roboto"/>
+              </a:rPr>
+              <a:t>мы создадим симулятор игры в боулинг.</a:t>
+            </a:r>
+          </a:p>
+          <a:p>
+            <a:pPr lvl="0">
+              <a:spcAft>
+                <a:spcPts val="2500"/>
+              </a:spcAft>
+              <a:buSzPts val="2000"/>
+            </a:pPr>
+            <a:r>
+              <a:rPr lang="ru-RU" sz="2000" dirty="0">
+                <a:solidFill>
+                  <a:srgbClr val="262626"/>
+                </a:solidFill>
+                <a:latin typeface="Roboto"/>
+                <a:ea typeface="Roboto"/>
+                <a:cs typeface="Roboto"/>
+                <a:sym typeface="Roboto"/>
+              </a:rPr>
+              <a:t>Наш основной класс </a:t>
+            </a:r>
+            <a:r>
+              <a:rPr lang="en-US" sz="2000" dirty="0">
+                <a:solidFill>
+                  <a:srgbClr val="262626"/>
+                </a:solidFill>
+                <a:latin typeface="Roboto"/>
+                <a:ea typeface="Roboto"/>
+                <a:cs typeface="Roboto"/>
+                <a:sym typeface="Roboto"/>
+              </a:rPr>
+              <a:t>(Game), </a:t>
+            </a:r>
+            <a:r>
+              <a:rPr lang="ru-RU" sz="2000" dirty="0">
+                <a:solidFill>
+                  <a:srgbClr val="262626"/>
+                </a:solidFill>
+                <a:latin typeface="Roboto"/>
+                <a:ea typeface="Roboto"/>
+                <a:cs typeface="Roboto"/>
+                <a:sym typeface="Roboto"/>
+              </a:rPr>
+              <a:t>будет состоять всего из двух методов: </a:t>
+            </a:r>
+            <a:r>
+              <a:rPr lang="en-US" sz="2000" dirty="0">
+                <a:solidFill>
+                  <a:srgbClr val="262626"/>
+                </a:solidFill>
+                <a:latin typeface="Roboto"/>
+                <a:ea typeface="Roboto"/>
+                <a:cs typeface="Roboto"/>
+                <a:sym typeface="Roboto"/>
+              </a:rPr>
+              <a:t>Roll(int pins), Score().</a:t>
+            </a:r>
+          </a:p>
+        </p:txBody>
+      </p:sp>
+      <p:sp>
+        <p:nvSpPr>
+          <p:cNvPr id="10" name="Shape 163">
+            <a:extLst>
+              <a:ext uri="{FF2B5EF4-FFF2-40B4-BE49-F238E27FC236}">
+                <a16:creationId xmlns:a16="http://schemas.microsoft.com/office/drawing/2014/main" id="{A68F1EA5-40D9-4E1C-9206-799111C747D8}"/>
+              </a:ext>
+            </a:extLst>
+          </p:cNvPr>
+          <p:cNvSpPr txBox="1"/>
+          <p:nvPr/>
+        </p:nvSpPr>
+        <p:spPr>
+          <a:xfrm>
+            <a:off x="353700" y="4672199"/>
+            <a:ext cx="8181300" cy="567087"/>
+          </a:xfrm>
+          <a:prstGeom prst="rect">
+            <a:avLst/>
+          </a:prstGeom>
+          <a:noFill/>
+          <a:ln>
+            <a:noFill/>
+          </a:ln>
+        </p:spPr>
+        <p:txBody>
+          <a:bodyPr spcFirstLastPara="1" wrap="square" lIns="91425" tIns="45700" rIns="91425" bIns="45700" anchor="ctr" anchorCtr="0">
+            <a:noAutofit/>
+          </a:bodyPr>
+          <a:lstStyle/>
+          <a:p>
+            <a:pPr lvl="0">
+              <a:spcAft>
+                <a:spcPts val="2500"/>
+              </a:spcAft>
+              <a:buSzPts val="2000"/>
+            </a:pPr>
+            <a:r>
+              <a:rPr lang="ru-RU" sz="2000" dirty="0">
+                <a:solidFill>
+                  <a:srgbClr val="262626"/>
+                </a:solidFill>
+                <a:latin typeface="Roboto"/>
+                <a:ea typeface="Roboto"/>
+                <a:cs typeface="Roboto"/>
+                <a:sym typeface="Roboto"/>
+              </a:rPr>
+              <a:t>Пример счета в боулинге: </a:t>
+            </a:r>
+            <a:endParaRPr lang="en-US" sz="2000" dirty="0">
+              <a:solidFill>
+                <a:srgbClr val="262626"/>
+              </a:solidFill>
+              <a:latin typeface="Roboto"/>
+              <a:ea typeface="Roboto"/>
+              <a:cs typeface="Roboto"/>
+              <a:sym typeface="Roboto"/>
+            </a:endParaRPr>
+          </a:p>
+        </p:txBody>
+      </p:sp>
+    </p:spTree>
+    <p:extLst>
+      <p:ext uri="{BB962C8B-B14F-4D97-AF65-F5344CB8AC3E}">
+        <p14:creationId xmlns:p14="http://schemas.microsoft.com/office/powerpoint/2010/main" val="962970464"/>
+      </p:ext>
+    </p:extLst>
+  </p:cSld>
+  <p:clrMapOvr>
+    <a:masterClrMapping/>
+  </p:clrMapOvr>
+  <p:transition>
+    <p:fade/>
+  </p:transition>
+</p:sld>
+</file>
+
+<file path=ppt/slides/slide11.xml><?xml version="1.0" encoding="utf-8"?>
+<p:sld xmlns:a="http://schemas.openxmlformats.org/drawingml/2006/main" xmlns:r="http://schemas.openxmlformats.org/officeDocument/2006/relationships" xmlns:p="http://schemas.openxmlformats.org/presentationml/2006/main">
+  <p:cSld>
+    <p:spTree>
+      <p:nvGrpSpPr>
+        <p:cNvPr id="1" name="Shape 156"/>
+        <p:cNvGrpSpPr/>
+        <p:nvPr/>
+      </p:nvGrpSpPr>
+      <p:grpSpPr>
+        <a:xfrm>
+          <a:off x="0" y="0"/>
+          <a:ext cx="0" cy="0"/>
+          <a:chOff x="0" y="0"/>
+          <a:chExt cx="0" cy="0"/>
+        </a:xfrm>
+      </p:grpSpPr>
+      <p:sp>
+        <p:nvSpPr>
+          <p:cNvPr id="158" name="Shape 158"/>
+          <p:cNvSpPr txBox="1">
+            <a:spLocks noGrp="1"/>
+          </p:cNvSpPr>
+          <p:nvPr>
+            <p:ph type="title"/>
+          </p:nvPr>
+        </p:nvSpPr>
+        <p:spPr>
+          <a:xfrm>
             <a:off x="443176" y="1054930"/>
             <a:ext cx="8229600" cy="1143000"/>
           </a:xfrm>
@@ -22432,6 +23167,809 @@
 </file>
 
 <file path=ppt/slides/slide5.xml><?xml version="1.0" encoding="utf-8"?>
+<p:sld xmlns:a="http://schemas.openxmlformats.org/drawingml/2006/main" xmlns:r="http://schemas.openxmlformats.org/officeDocument/2006/relationships" xmlns:p="http://schemas.openxmlformats.org/presentationml/2006/main">
+  <p:cSld>
+    <p:spTree>
+      <p:nvGrpSpPr>
+        <p:cNvPr id="1" name="Shape 156"/>
+        <p:cNvGrpSpPr/>
+        <p:nvPr/>
+      </p:nvGrpSpPr>
+      <p:grpSpPr>
+        <a:xfrm>
+          <a:off x="0" y="0"/>
+          <a:ext cx="0" cy="0"/>
+          <a:chOff x="0" y="0"/>
+          <a:chExt cx="0" cy="0"/>
+        </a:xfrm>
+      </p:grpSpPr>
+      <p:sp>
+        <p:nvSpPr>
+          <p:cNvPr id="158" name="Shape 158"/>
+          <p:cNvSpPr txBox="1">
+            <a:spLocks noGrp="1"/>
+          </p:cNvSpPr>
+          <p:nvPr>
+            <p:ph type="title"/>
+          </p:nvPr>
+        </p:nvSpPr>
+        <p:spPr>
+          <a:xfrm>
+            <a:off x="443176" y="1116448"/>
+            <a:ext cx="8229600" cy="1143000"/>
+          </a:xfrm>
+          <a:prstGeom prst="rect">
+            <a:avLst/>
+          </a:prstGeom>
+          <a:noFill/>
+          <a:ln>
+            <a:noFill/>
+          </a:ln>
+        </p:spPr>
+        <p:txBody>
+          <a:bodyPr spcFirstLastPara="1" wrap="square" lIns="91425" tIns="45700" rIns="91425" bIns="45700" anchor="ctr" anchorCtr="0">
+            <a:noAutofit/>
+          </a:bodyPr>
+          <a:lstStyle/>
+          <a:p>
+            <a:pPr marL="0" marR="0" lvl="0" indent="0" algn="l" rtl="0">
+              <a:spcBef>
+                <a:spcPts val="0"/>
+              </a:spcBef>
+              <a:spcAft>
+                <a:spcPts val="0"/>
+              </a:spcAft>
+              <a:buClr>
+                <a:schemeClr val="dk1"/>
+              </a:buClr>
+              <a:buSzPts val="4400"/>
+              <a:buFont typeface="Calibri"/>
+              <a:buNone/>
+            </a:pPr>
+            <a:r>
+              <a:rPr lang="ru-RU" sz="4100" b="1" dirty="0">
+                <a:solidFill>
+                  <a:srgbClr val="262626"/>
+                </a:solidFill>
+                <a:latin typeface="Roboto"/>
+                <a:ea typeface="Roboto"/>
+                <a:cs typeface="Roboto"/>
+                <a:sym typeface="Roboto"/>
+              </a:rPr>
+              <a:t>Сигнатура </a:t>
+            </a:r>
+            <a:r>
+              <a:rPr lang="en-US" sz="4100" b="1" dirty="0">
+                <a:solidFill>
+                  <a:srgbClr val="262626"/>
+                </a:solidFill>
+                <a:latin typeface="Roboto"/>
+                <a:ea typeface="Roboto"/>
+                <a:cs typeface="Roboto"/>
+                <a:sym typeface="Roboto"/>
+              </a:rPr>
+              <a:t>Unit </a:t>
+            </a:r>
+            <a:r>
+              <a:rPr lang="ru-RU" sz="4100" b="1" dirty="0">
+                <a:solidFill>
+                  <a:srgbClr val="262626"/>
+                </a:solidFill>
+                <a:latin typeface="Roboto"/>
+                <a:ea typeface="Roboto"/>
+                <a:cs typeface="Roboto"/>
+                <a:sym typeface="Roboto"/>
+              </a:rPr>
+              <a:t>теста</a:t>
+            </a:r>
+            <a:endParaRPr sz="4100" b="1" i="0" u="none" strike="noStrike" cap="none" dirty="0">
+              <a:solidFill>
+                <a:srgbClr val="262626"/>
+              </a:solidFill>
+              <a:latin typeface="Roboto"/>
+              <a:ea typeface="Roboto"/>
+              <a:cs typeface="Roboto"/>
+              <a:sym typeface="Roboto"/>
+            </a:endParaRPr>
+          </a:p>
+        </p:txBody>
+      </p:sp>
+      <p:sp>
+        <p:nvSpPr>
+          <p:cNvPr id="159" name="Shape 159"/>
+          <p:cNvSpPr/>
+          <p:nvPr/>
+        </p:nvSpPr>
+        <p:spPr>
+          <a:xfrm>
+            <a:off x="7145316" y="408237"/>
+            <a:ext cx="1856100" cy="290400"/>
+          </a:xfrm>
+          <a:prstGeom prst="roundRect">
+            <a:avLst>
+              <a:gd name="adj" fmla="val 0"/>
+            </a:avLst>
+          </a:prstGeom>
+          <a:noFill/>
+          <a:ln>
+            <a:noFill/>
+          </a:ln>
+        </p:spPr>
+        <p:txBody>
+          <a:bodyPr spcFirstLastPara="1" wrap="square" lIns="91425" tIns="45700" rIns="91425" bIns="45700" anchor="ctr" anchorCtr="0">
+            <a:noAutofit/>
+          </a:bodyPr>
+          <a:lstStyle/>
+          <a:p>
+            <a:pPr marL="0" marR="0" lvl="0" indent="0" algn="ctr" rtl="0">
+              <a:spcBef>
+                <a:spcPts val="0"/>
+              </a:spcBef>
+              <a:spcAft>
+                <a:spcPts val="0"/>
+              </a:spcAft>
+              <a:buClr>
+                <a:schemeClr val="lt1"/>
+              </a:buClr>
+              <a:buSzPts val="1200"/>
+              <a:buFont typeface="Arial"/>
+              <a:buNone/>
+            </a:pPr>
+            <a:r>
+              <a:rPr lang="en-US" sz="1500" b="1" i="0" strike="noStrike" cap="none">
+                <a:solidFill>
+                  <a:srgbClr val="262626"/>
+                </a:solidFill>
+                <a:latin typeface="Roboto"/>
+                <a:ea typeface="Roboto"/>
+                <a:cs typeface="Roboto"/>
+                <a:sym typeface="Roboto"/>
+              </a:rPr>
+              <a:t>www.itea.ua</a:t>
+            </a:r>
+            <a:endParaRPr sz="1500" b="1" i="0" strike="noStrike" cap="none">
+              <a:solidFill>
+                <a:srgbClr val="262626"/>
+              </a:solidFill>
+              <a:latin typeface="Roboto"/>
+              <a:ea typeface="Roboto"/>
+              <a:cs typeface="Roboto"/>
+              <a:sym typeface="Roboto"/>
+            </a:endParaRPr>
+          </a:p>
+        </p:txBody>
+      </p:sp>
+      <p:sp>
+        <p:nvSpPr>
+          <p:cNvPr id="160" name="Shape 160"/>
+          <p:cNvSpPr/>
+          <p:nvPr/>
+        </p:nvSpPr>
+        <p:spPr>
+          <a:xfrm rot="10800000" flipH="1">
+            <a:off x="0" y="1127850"/>
+            <a:ext cx="3143100" cy="42300"/>
+          </a:xfrm>
+          <a:prstGeom prst="rect">
+            <a:avLst/>
+          </a:prstGeom>
+          <a:solidFill>
+            <a:srgbClr val="CC0000"/>
+          </a:solidFill>
+          <a:ln>
+            <a:noFill/>
+          </a:ln>
+        </p:spPr>
+        <p:txBody>
+          <a:bodyPr spcFirstLastPara="1" wrap="square" lIns="91425" tIns="91425" rIns="91425" bIns="91425" anchor="ctr" anchorCtr="0">
+            <a:noAutofit/>
+          </a:bodyPr>
+          <a:lstStyle/>
+          <a:p>
+            <a:pPr marL="0" lvl="0" indent="0">
+              <a:spcBef>
+                <a:spcPts val="0"/>
+              </a:spcBef>
+              <a:spcAft>
+                <a:spcPts val="0"/>
+              </a:spcAft>
+              <a:buNone/>
+            </a:pPr>
+            <a:r>
+              <a:rPr lang="en-US"/>
+              <a:t>                                                                                     </a:t>
+            </a:r>
+            <a:endParaRPr/>
+          </a:p>
+        </p:txBody>
+      </p:sp>
+      <p:sp>
+        <p:nvSpPr>
+          <p:cNvPr id="161" name="Shape 161"/>
+          <p:cNvSpPr/>
+          <p:nvPr/>
+        </p:nvSpPr>
+        <p:spPr>
+          <a:xfrm rot="10800000" flipH="1">
+            <a:off x="3067050" y="1127850"/>
+            <a:ext cx="3143100" cy="42300"/>
+          </a:xfrm>
+          <a:prstGeom prst="rect">
+            <a:avLst/>
+          </a:prstGeom>
+          <a:solidFill>
+            <a:srgbClr val="262626"/>
+          </a:solidFill>
+          <a:ln>
+            <a:noFill/>
+          </a:ln>
+        </p:spPr>
+        <p:txBody>
+          <a:bodyPr spcFirstLastPara="1" wrap="square" lIns="91425" tIns="91425" rIns="91425" bIns="91425" anchor="ctr" anchorCtr="0">
+            <a:noAutofit/>
+          </a:bodyPr>
+          <a:lstStyle/>
+          <a:p>
+            <a:pPr marL="0" lvl="0" indent="0">
+              <a:spcBef>
+                <a:spcPts val="0"/>
+              </a:spcBef>
+              <a:spcAft>
+                <a:spcPts val="0"/>
+              </a:spcAft>
+              <a:buNone/>
+            </a:pPr>
+            <a:endParaRPr/>
+          </a:p>
+        </p:txBody>
+      </p:sp>
+      <p:pic>
+        <p:nvPicPr>
+          <p:cNvPr id="162" name="Shape 162"/>
+          <p:cNvPicPr preferRelativeResize="0"/>
+          <p:nvPr/>
+        </p:nvPicPr>
+        <p:blipFill>
+          <a:blip r:embed="rId3">
+            <a:alphaModFix/>
+          </a:blip>
+          <a:stretch>
+            <a:fillRect/>
+          </a:stretch>
+        </p:blipFill>
+        <p:spPr>
+          <a:xfrm>
+            <a:off x="353700" y="302000"/>
+            <a:ext cx="1741800" cy="502875"/>
+          </a:xfrm>
+          <a:prstGeom prst="rect">
+            <a:avLst/>
+          </a:prstGeom>
+          <a:noFill/>
+          <a:ln>
+            <a:noFill/>
+          </a:ln>
+        </p:spPr>
+      </p:pic>
+      <p:sp>
+        <p:nvSpPr>
+          <p:cNvPr id="163" name="Shape 163"/>
+          <p:cNvSpPr txBox="1"/>
+          <p:nvPr/>
+        </p:nvSpPr>
+        <p:spPr>
+          <a:xfrm>
+            <a:off x="353700" y="2280845"/>
+            <a:ext cx="8181300" cy="4445297"/>
+          </a:xfrm>
+          <a:prstGeom prst="rect">
+            <a:avLst/>
+          </a:prstGeom>
+          <a:noFill/>
+          <a:ln>
+            <a:noFill/>
+          </a:ln>
+        </p:spPr>
+        <p:txBody>
+          <a:bodyPr spcFirstLastPara="1" wrap="square" lIns="91425" tIns="45700" rIns="91425" bIns="45700" anchor="ctr" anchorCtr="0">
+            <a:noAutofit/>
+          </a:bodyPr>
+          <a:lstStyle/>
+          <a:p>
+            <a:pPr lvl="0" indent="-12700">
+              <a:spcAft>
+                <a:spcPts val="1200"/>
+              </a:spcAft>
+              <a:buSzPts val="2000"/>
+              <a:buFont typeface="Noto Sans Symbols"/>
+              <a:buChar char="▪"/>
+            </a:pPr>
+            <a:r>
+              <a:rPr lang="ru-RU" sz="2000" b="1" dirty="0">
+                <a:solidFill>
+                  <a:srgbClr val="262626"/>
+                </a:solidFill>
+                <a:latin typeface="Roboto"/>
+                <a:ea typeface="Roboto"/>
+                <a:cs typeface="Roboto"/>
+                <a:sym typeface="Roboto"/>
+              </a:rPr>
+              <a:t> </a:t>
+            </a:r>
+            <a:r>
+              <a:rPr lang="ru-RU" sz="2000" dirty="0">
+                <a:solidFill>
+                  <a:srgbClr val="262626"/>
+                </a:solidFill>
+                <a:latin typeface="Roboto"/>
+                <a:ea typeface="Roboto"/>
+                <a:cs typeface="Roboto"/>
+                <a:sym typeface="Roboto"/>
+              </a:rPr>
+              <a:t>В самом популярном варианте название </a:t>
+            </a:r>
+            <a:r>
+              <a:rPr lang="en-US" sz="2000" dirty="0">
+                <a:solidFill>
+                  <a:srgbClr val="262626"/>
+                </a:solidFill>
+                <a:latin typeface="Roboto"/>
+                <a:ea typeface="Roboto"/>
+                <a:cs typeface="Roboto"/>
+                <a:sym typeface="Roboto"/>
+              </a:rPr>
+              <a:t>Unit </a:t>
+            </a:r>
+            <a:r>
+              <a:rPr lang="ru-RU" sz="2000" dirty="0">
+                <a:solidFill>
+                  <a:srgbClr val="262626"/>
+                </a:solidFill>
+                <a:latin typeface="Roboto"/>
+                <a:ea typeface="Roboto"/>
+                <a:cs typeface="Roboto"/>
+                <a:sym typeface="Roboto"/>
+              </a:rPr>
+              <a:t>теста должно состоять из </a:t>
+            </a:r>
+            <a:r>
+              <a:rPr lang="en-US" sz="2000" dirty="0">
+                <a:solidFill>
+                  <a:srgbClr val="262626"/>
+                </a:solidFill>
+                <a:latin typeface="Roboto"/>
+                <a:ea typeface="Roboto"/>
+                <a:cs typeface="Roboto"/>
+                <a:sym typeface="Roboto"/>
+              </a:rPr>
+              <a:t>3 </a:t>
+            </a:r>
+            <a:r>
+              <a:rPr lang="ru-RU" sz="2000" dirty="0">
+                <a:solidFill>
+                  <a:srgbClr val="262626"/>
+                </a:solidFill>
+                <a:latin typeface="Roboto"/>
+                <a:ea typeface="Roboto"/>
+                <a:cs typeface="Roboto"/>
+                <a:sym typeface="Roboto"/>
+              </a:rPr>
+              <a:t>частей: </a:t>
+            </a:r>
+          </a:p>
+          <a:p>
+            <a:pPr lvl="0">
+              <a:spcAft>
+                <a:spcPts val="1200"/>
+              </a:spcAft>
+              <a:buSzPts val="2000"/>
+            </a:pPr>
+            <a:r>
+              <a:rPr lang="en-US" sz="2000" b="1" i="1" dirty="0">
+                <a:solidFill>
+                  <a:srgbClr val="262626"/>
+                </a:solidFill>
+                <a:latin typeface="Roboto"/>
+                <a:ea typeface="Roboto"/>
+                <a:cs typeface="Roboto"/>
+                <a:sym typeface="Roboto"/>
+              </a:rPr>
+              <a:t>{</a:t>
+            </a:r>
+            <a:r>
+              <a:rPr lang="ru-RU" sz="2000" b="1" i="1" dirty="0">
+                <a:solidFill>
+                  <a:srgbClr val="262626"/>
+                </a:solidFill>
+                <a:latin typeface="Roboto"/>
+                <a:ea typeface="Roboto"/>
+                <a:cs typeface="Roboto"/>
+                <a:sym typeface="Roboto"/>
+              </a:rPr>
+              <a:t>тестируемый метод</a:t>
+            </a:r>
+            <a:r>
+              <a:rPr lang="en-US" sz="2000" b="1" i="1" dirty="0">
+                <a:solidFill>
+                  <a:srgbClr val="262626"/>
+                </a:solidFill>
+                <a:latin typeface="Roboto"/>
+                <a:ea typeface="Roboto"/>
+                <a:cs typeface="Roboto"/>
+                <a:sym typeface="Roboto"/>
+              </a:rPr>
+              <a:t>}</a:t>
+            </a:r>
+            <a:r>
+              <a:rPr lang="ru-RU" sz="2000" b="1" i="1" dirty="0">
+                <a:solidFill>
+                  <a:srgbClr val="262626"/>
+                </a:solidFill>
+                <a:latin typeface="Roboto"/>
+                <a:ea typeface="Roboto"/>
+                <a:cs typeface="Roboto"/>
+                <a:sym typeface="Roboto"/>
+              </a:rPr>
+              <a:t>_</a:t>
+            </a:r>
+            <a:r>
+              <a:rPr lang="en-US" sz="2000" b="1" i="1" dirty="0">
+                <a:solidFill>
+                  <a:srgbClr val="262626"/>
+                </a:solidFill>
+                <a:latin typeface="Roboto"/>
+                <a:ea typeface="Roboto"/>
+                <a:cs typeface="Roboto"/>
+                <a:sym typeface="Roboto"/>
+              </a:rPr>
+              <a:t>{</a:t>
+            </a:r>
+            <a:r>
+              <a:rPr lang="ru-RU" sz="2000" b="1" i="1" dirty="0">
+                <a:solidFill>
+                  <a:srgbClr val="262626"/>
+                </a:solidFill>
+                <a:latin typeface="Roboto"/>
+                <a:ea typeface="Roboto"/>
+                <a:cs typeface="Roboto"/>
+                <a:sym typeface="Roboto"/>
+              </a:rPr>
+              <a:t>условие</a:t>
+            </a:r>
+            <a:r>
+              <a:rPr lang="en-US" sz="2000" b="1" i="1" dirty="0">
+                <a:solidFill>
+                  <a:srgbClr val="262626"/>
+                </a:solidFill>
+                <a:latin typeface="Roboto"/>
+                <a:ea typeface="Roboto"/>
+                <a:cs typeface="Roboto"/>
+                <a:sym typeface="Roboto"/>
+              </a:rPr>
+              <a:t>/</a:t>
+            </a:r>
+            <a:r>
+              <a:rPr lang="ru-RU" sz="2000" b="1" i="1" dirty="0">
+                <a:solidFill>
+                  <a:srgbClr val="262626"/>
+                </a:solidFill>
+                <a:latin typeface="Roboto"/>
+                <a:ea typeface="Roboto"/>
+                <a:cs typeface="Roboto"/>
+                <a:sym typeface="Roboto"/>
+              </a:rPr>
+              <a:t>выполняемое действие</a:t>
+            </a:r>
+            <a:r>
+              <a:rPr lang="en-US" sz="2000" b="1" i="1" dirty="0">
+                <a:solidFill>
+                  <a:srgbClr val="262626"/>
+                </a:solidFill>
+                <a:latin typeface="Roboto"/>
+                <a:ea typeface="Roboto"/>
+                <a:cs typeface="Roboto"/>
+                <a:sym typeface="Roboto"/>
+              </a:rPr>
+              <a:t>}_{</a:t>
+            </a:r>
+            <a:r>
+              <a:rPr lang="ru-RU" sz="2000" b="1" i="1" dirty="0">
+                <a:solidFill>
+                  <a:srgbClr val="262626"/>
+                </a:solidFill>
+                <a:latin typeface="Roboto"/>
+                <a:ea typeface="Roboto"/>
+                <a:cs typeface="Roboto"/>
+                <a:sym typeface="Roboto"/>
+              </a:rPr>
+              <a:t>ожидаемый результат</a:t>
+            </a:r>
+            <a:r>
+              <a:rPr lang="en-US" sz="2000" b="1" i="1" dirty="0">
+                <a:solidFill>
+                  <a:srgbClr val="262626"/>
+                </a:solidFill>
+                <a:latin typeface="Roboto"/>
+                <a:ea typeface="Roboto"/>
+                <a:cs typeface="Roboto"/>
+                <a:sym typeface="Roboto"/>
+              </a:rPr>
+              <a:t>}</a:t>
+            </a:r>
+            <a:endParaRPr lang="ru-RU" sz="2000" b="1" i="1" dirty="0">
+              <a:solidFill>
+                <a:srgbClr val="262626"/>
+              </a:solidFill>
+              <a:latin typeface="Roboto"/>
+              <a:ea typeface="Roboto"/>
+              <a:cs typeface="Roboto"/>
+              <a:sym typeface="Roboto"/>
+            </a:endParaRPr>
+          </a:p>
+          <a:p>
+            <a:pPr lvl="0">
+              <a:spcAft>
+                <a:spcPts val="1200"/>
+              </a:spcAft>
+              <a:buSzPts val="2000"/>
+            </a:pPr>
+            <a:r>
+              <a:rPr lang="ru-RU" sz="2000" i="1" dirty="0">
+                <a:solidFill>
+                  <a:srgbClr val="262626"/>
+                </a:solidFill>
+                <a:latin typeface="Roboto"/>
+                <a:ea typeface="Roboto"/>
+                <a:cs typeface="Roboto"/>
+                <a:sym typeface="Roboto"/>
+              </a:rPr>
+              <a:t>или</a:t>
+            </a:r>
+            <a:endParaRPr lang="ru-RU" sz="2000" dirty="0">
+              <a:solidFill>
+                <a:srgbClr val="262626"/>
+              </a:solidFill>
+              <a:latin typeface="Roboto"/>
+              <a:ea typeface="Roboto"/>
+              <a:cs typeface="Roboto"/>
+              <a:sym typeface="Roboto"/>
+            </a:endParaRPr>
+          </a:p>
+          <a:p>
+            <a:pPr lvl="0">
+              <a:spcAft>
+                <a:spcPts val="1200"/>
+              </a:spcAft>
+              <a:buSzPts val="2000"/>
+            </a:pPr>
+            <a:r>
+              <a:rPr lang="en-US" sz="2000" b="1" i="1" dirty="0">
+                <a:solidFill>
+                  <a:srgbClr val="262626"/>
+                </a:solidFill>
+                <a:latin typeface="Roboto"/>
+                <a:ea typeface="Roboto"/>
+                <a:cs typeface="Roboto"/>
+                <a:sym typeface="Roboto"/>
+              </a:rPr>
+              <a:t>{</a:t>
+            </a:r>
+            <a:r>
+              <a:rPr lang="ru-RU" sz="2000" b="1" i="1" dirty="0">
+                <a:solidFill>
+                  <a:srgbClr val="262626"/>
+                </a:solidFill>
+                <a:latin typeface="Roboto"/>
+                <a:ea typeface="Roboto"/>
+                <a:cs typeface="Roboto"/>
+                <a:sym typeface="Roboto"/>
+              </a:rPr>
+              <a:t>тестируемый обьект</a:t>
+            </a:r>
+            <a:r>
+              <a:rPr lang="en-US" sz="2000" b="1" i="1" dirty="0">
+                <a:solidFill>
+                  <a:srgbClr val="262626"/>
+                </a:solidFill>
+                <a:latin typeface="Roboto"/>
+                <a:ea typeface="Roboto"/>
+                <a:cs typeface="Roboto"/>
+                <a:sym typeface="Roboto"/>
+              </a:rPr>
+              <a:t>}</a:t>
+            </a:r>
+            <a:r>
+              <a:rPr lang="ru-RU" sz="2000" b="1" i="1" dirty="0">
+                <a:solidFill>
+                  <a:srgbClr val="262626"/>
+                </a:solidFill>
+                <a:latin typeface="Roboto"/>
+                <a:ea typeface="Roboto"/>
+                <a:cs typeface="Roboto"/>
+                <a:sym typeface="Roboto"/>
+              </a:rPr>
+              <a:t>_</a:t>
+            </a:r>
+            <a:r>
+              <a:rPr lang="en-US" sz="2000" b="1" i="1" dirty="0">
+                <a:solidFill>
+                  <a:srgbClr val="262626"/>
+                </a:solidFill>
+                <a:latin typeface="Roboto"/>
+                <a:ea typeface="Roboto"/>
+                <a:cs typeface="Roboto"/>
+                <a:sym typeface="Roboto"/>
+              </a:rPr>
+              <a:t>{</a:t>
+            </a:r>
+            <a:r>
+              <a:rPr lang="ru-RU" sz="2000" b="1" i="1" dirty="0">
+                <a:solidFill>
+                  <a:srgbClr val="262626"/>
+                </a:solidFill>
+                <a:latin typeface="Roboto"/>
+                <a:ea typeface="Roboto"/>
+                <a:cs typeface="Roboto"/>
+                <a:sym typeface="Roboto"/>
+              </a:rPr>
+              <a:t>тестируемый метод</a:t>
+            </a:r>
+            <a:r>
+              <a:rPr lang="en-US" sz="2000" b="1" i="1" dirty="0">
+                <a:solidFill>
+                  <a:srgbClr val="262626"/>
+                </a:solidFill>
+                <a:latin typeface="Roboto"/>
+                <a:ea typeface="Roboto"/>
+                <a:cs typeface="Roboto"/>
+                <a:sym typeface="Roboto"/>
+              </a:rPr>
+              <a:t>}</a:t>
+            </a:r>
+            <a:r>
+              <a:rPr lang="ru-RU" sz="2000" b="1" i="1" dirty="0">
+                <a:solidFill>
+                  <a:srgbClr val="262626"/>
+                </a:solidFill>
+                <a:latin typeface="Roboto"/>
+                <a:ea typeface="Roboto"/>
+                <a:cs typeface="Roboto"/>
+                <a:sym typeface="Roboto"/>
+              </a:rPr>
+              <a:t>_</a:t>
+            </a:r>
+            <a:r>
+              <a:rPr lang="en-US" sz="2000" b="1" i="1" dirty="0">
+                <a:solidFill>
+                  <a:srgbClr val="262626"/>
+                </a:solidFill>
+                <a:latin typeface="Roboto"/>
+                <a:ea typeface="Roboto"/>
+                <a:cs typeface="Roboto"/>
+                <a:sym typeface="Roboto"/>
+              </a:rPr>
+              <a:t>{</a:t>
+            </a:r>
+            <a:r>
+              <a:rPr lang="ru-RU" sz="2000" b="1" i="1" dirty="0">
+                <a:solidFill>
+                  <a:srgbClr val="262626"/>
+                </a:solidFill>
+                <a:latin typeface="Roboto"/>
+                <a:ea typeface="Roboto"/>
+                <a:cs typeface="Roboto"/>
+                <a:sym typeface="Roboto"/>
+              </a:rPr>
+              <a:t>условие</a:t>
+            </a:r>
+            <a:r>
+              <a:rPr lang="en-US" sz="2000" b="1" i="1" dirty="0">
+                <a:solidFill>
+                  <a:srgbClr val="262626"/>
+                </a:solidFill>
+                <a:latin typeface="Roboto"/>
+                <a:ea typeface="Roboto"/>
+                <a:cs typeface="Roboto"/>
+                <a:sym typeface="Roboto"/>
+              </a:rPr>
+              <a:t>/</a:t>
+            </a:r>
+            <a:r>
+              <a:rPr lang="ru-RU" sz="2000" b="1" i="1" dirty="0">
+                <a:solidFill>
+                  <a:srgbClr val="262626"/>
+                </a:solidFill>
+                <a:latin typeface="Roboto"/>
+                <a:ea typeface="Roboto"/>
+                <a:cs typeface="Roboto"/>
+                <a:sym typeface="Roboto"/>
+              </a:rPr>
+              <a:t>ожидаемый результат</a:t>
+            </a:r>
+            <a:r>
+              <a:rPr lang="en-US" sz="2000" b="1" i="1" dirty="0">
+                <a:solidFill>
+                  <a:srgbClr val="262626"/>
+                </a:solidFill>
+                <a:latin typeface="Roboto"/>
+                <a:ea typeface="Roboto"/>
+                <a:cs typeface="Roboto"/>
+                <a:sym typeface="Roboto"/>
+              </a:rPr>
+              <a:t>}</a:t>
+            </a:r>
+            <a:endParaRPr lang="ru-RU" sz="2000" b="1" i="1" dirty="0">
+              <a:solidFill>
+                <a:srgbClr val="262626"/>
+              </a:solidFill>
+              <a:latin typeface="Roboto"/>
+              <a:ea typeface="Roboto"/>
+              <a:cs typeface="Roboto"/>
+              <a:sym typeface="Roboto"/>
+            </a:endParaRPr>
+          </a:p>
+          <a:p>
+            <a:pPr lvl="0" indent="-12700">
+              <a:spcAft>
+                <a:spcPts val="1200"/>
+              </a:spcAft>
+              <a:buSzPts val="2000"/>
+              <a:buFont typeface="Noto Sans Symbols"/>
+              <a:buChar char="▪"/>
+            </a:pPr>
+            <a:r>
+              <a:rPr lang="en-US" sz="2000" dirty="0">
+                <a:solidFill>
+                  <a:srgbClr val="262626"/>
+                </a:solidFill>
+                <a:latin typeface="Roboto"/>
+                <a:ea typeface="Roboto"/>
+                <a:cs typeface="Roboto"/>
+                <a:sym typeface="Roboto"/>
+              </a:rPr>
+              <a:t> </a:t>
+            </a:r>
+            <a:r>
+              <a:rPr lang="ru-RU" sz="2000" dirty="0">
+                <a:solidFill>
+                  <a:srgbClr val="262626"/>
+                </a:solidFill>
+                <a:latin typeface="Roboto"/>
+                <a:ea typeface="Roboto"/>
+                <a:cs typeface="Roboto"/>
+                <a:sym typeface="Roboto"/>
+              </a:rPr>
+              <a:t>Если указание какого то из блоков названия не несет в себе смысла - этот блок можно упустить.</a:t>
+            </a:r>
+            <a:endParaRPr lang="en-US" sz="2000" dirty="0">
+              <a:solidFill>
+                <a:srgbClr val="262626"/>
+              </a:solidFill>
+              <a:latin typeface="Roboto"/>
+              <a:ea typeface="Roboto"/>
+              <a:cs typeface="Roboto"/>
+              <a:sym typeface="Roboto"/>
+            </a:endParaRPr>
+          </a:p>
+        </p:txBody>
+      </p:sp>
+    </p:spTree>
+    <p:extLst>
+      <p:ext uri="{BB962C8B-B14F-4D97-AF65-F5344CB8AC3E}">
+        <p14:creationId xmlns:p14="http://schemas.microsoft.com/office/powerpoint/2010/main" val="1251462973"/>
+      </p:ext>
+    </p:extLst>
+  </p:cSld>
+  <p:clrMapOvr>
+    <a:masterClrMapping/>
+  </p:clrMapOvr>
+  <p:transition>
+    <p:fade/>
+  </p:transition>
+</p:sld>
+</file>
+
+<file path=ppt/slides/slide6.xml><?xml version="1.0" encoding="utf-8"?>
 <p:sld xmlns:a="http://schemas.openxmlformats.org/drawingml/2006/main" xmlns:r="http://schemas.openxmlformats.org/officeDocument/2006/relationships" xmlns:p="http://schemas.openxmlformats.org/presentationml/2006/main" show="0">
   <p:cSld>
     <p:spTree>
@@ -22750,7 +24288,7 @@
 </p:sld>
 </file>
 
-<file path=ppt/slides/slide6.xml><?xml version="1.0" encoding="utf-8"?>
+<file path=ppt/slides/slide7.xml><?xml version="1.0" encoding="utf-8"?>
 <p:sld xmlns:a="http://schemas.openxmlformats.org/drawingml/2006/main" xmlns:r="http://schemas.openxmlformats.org/officeDocument/2006/relationships" xmlns:p="http://schemas.openxmlformats.org/presentationml/2006/main">
   <p:cSld>
     <p:spTree>
@@ -23185,7 +24723,7 @@
 </p:sld>
 </file>
 
-<file path=ppt/slides/slide7.xml><?xml version="1.0" encoding="utf-8"?>
+<file path=ppt/slides/slide8.xml><?xml version="1.0" encoding="utf-8"?>
 <p:sld xmlns:a="http://schemas.openxmlformats.org/drawingml/2006/main" xmlns:r="http://schemas.openxmlformats.org/officeDocument/2006/relationships" xmlns:p="http://schemas.openxmlformats.org/presentationml/2006/main">
   <p:cSld>
     <p:spTree>
@@ -23738,7 +25276,7 @@
 </p:sld>
 </file>
 
-<file path=ppt/slides/slide8.xml><?xml version="1.0" encoding="utf-8"?>
+<file path=ppt/slides/slide9.xml><?xml version="1.0" encoding="utf-8"?>
 <p:sld xmlns:a="http://schemas.openxmlformats.org/drawingml/2006/main" xmlns:r="http://schemas.openxmlformats.org/officeDocument/2006/relationships" xmlns:p="http://schemas.openxmlformats.org/presentationml/2006/main">
   <p:cSld>
     <p:spTree>
@@ -24141,547 +25679,6 @@
     <p:extLst>
       <p:ext uri="{BB962C8B-B14F-4D97-AF65-F5344CB8AC3E}">
         <p14:creationId xmlns:p14="http://schemas.microsoft.com/office/powerpoint/2010/main" val="1678068947"/>
-      </p:ext>
-    </p:extLst>
-  </p:cSld>
-  <p:clrMapOvr>
-    <a:masterClrMapping/>
-  </p:clrMapOvr>
-  <p:transition>
-    <p:fade/>
-  </p:transition>
-</p:sld>
-</file>
-
-<file path=ppt/slides/slide9.xml><?xml version="1.0" encoding="utf-8"?>
-<p:sld xmlns:a="http://schemas.openxmlformats.org/drawingml/2006/main" xmlns:r="http://schemas.openxmlformats.org/officeDocument/2006/relationships" xmlns:p="http://schemas.openxmlformats.org/presentationml/2006/main">
-  <p:cSld>
-    <p:spTree>
-      <p:nvGrpSpPr>
-        <p:cNvPr id="1" name="Shape 156"/>
-        <p:cNvGrpSpPr/>
-        <p:nvPr/>
-      </p:nvGrpSpPr>
-      <p:grpSpPr>
-        <a:xfrm>
-          <a:off x="0" y="0"/>
-          <a:ext cx="0" cy="0"/>
-          <a:chOff x="0" y="0"/>
-          <a:chExt cx="0" cy="0"/>
-        </a:xfrm>
-      </p:grpSpPr>
-      <p:sp>
-        <p:nvSpPr>
-          <p:cNvPr id="158" name="Shape 158"/>
-          <p:cNvSpPr txBox="1">
-            <a:spLocks noGrp="1"/>
-          </p:cNvSpPr>
-          <p:nvPr>
-            <p:ph type="title"/>
-          </p:nvPr>
-        </p:nvSpPr>
-        <p:spPr>
-          <a:xfrm>
-            <a:off x="443176" y="1116448"/>
-            <a:ext cx="8229600" cy="1143000"/>
-          </a:xfrm>
-          <a:prstGeom prst="rect">
-            <a:avLst/>
-          </a:prstGeom>
-          <a:noFill/>
-          <a:ln>
-            <a:noFill/>
-          </a:ln>
-        </p:spPr>
-        <p:txBody>
-          <a:bodyPr spcFirstLastPara="1" wrap="square" lIns="91425" tIns="45700" rIns="91425" bIns="45700" anchor="ctr" anchorCtr="0">
-            <a:noAutofit/>
-          </a:bodyPr>
-          <a:lstStyle/>
-          <a:p>
-            <a:pPr marL="0" marR="0" lvl="0" indent="0" algn="l" rtl="0">
-              <a:spcBef>
-                <a:spcPts val="0"/>
-              </a:spcBef>
-              <a:spcAft>
-                <a:spcPts val="0"/>
-              </a:spcAft>
-              <a:buClr>
-                <a:schemeClr val="dk1"/>
-              </a:buClr>
-              <a:buSzPts val="4400"/>
-              <a:buFont typeface="Calibri"/>
-              <a:buNone/>
-            </a:pPr>
-            <a:r>
-              <a:rPr lang="en-US" sz="4100" b="1" i="0" u="none" strike="noStrike" cap="none" dirty="0">
-                <a:solidFill>
-                  <a:srgbClr val="262626"/>
-                </a:solidFill>
-                <a:latin typeface="Roboto"/>
-                <a:ea typeface="Roboto"/>
-                <a:cs typeface="Roboto"/>
-                <a:sym typeface="Roboto"/>
-              </a:rPr>
-              <a:t>The Bowling Game Example</a:t>
-            </a:r>
-            <a:endParaRPr sz="4100" b="1" i="0" u="none" strike="noStrike" cap="none" dirty="0">
-              <a:solidFill>
-                <a:srgbClr val="262626"/>
-              </a:solidFill>
-              <a:latin typeface="Roboto"/>
-              <a:ea typeface="Roboto"/>
-              <a:cs typeface="Roboto"/>
-              <a:sym typeface="Roboto"/>
-            </a:endParaRPr>
-          </a:p>
-        </p:txBody>
-      </p:sp>
-      <p:sp>
-        <p:nvSpPr>
-          <p:cNvPr id="159" name="Shape 159"/>
-          <p:cNvSpPr/>
-          <p:nvPr/>
-        </p:nvSpPr>
-        <p:spPr>
-          <a:xfrm>
-            <a:off x="7145316" y="408237"/>
-            <a:ext cx="1856100" cy="290400"/>
-          </a:xfrm>
-          <a:prstGeom prst="roundRect">
-            <a:avLst>
-              <a:gd name="adj" fmla="val 0"/>
-            </a:avLst>
-          </a:prstGeom>
-          <a:noFill/>
-          <a:ln>
-            <a:noFill/>
-          </a:ln>
-        </p:spPr>
-        <p:txBody>
-          <a:bodyPr spcFirstLastPara="1" wrap="square" lIns="91425" tIns="45700" rIns="91425" bIns="45700" anchor="ctr" anchorCtr="0">
-            <a:noAutofit/>
-          </a:bodyPr>
-          <a:lstStyle/>
-          <a:p>
-            <a:pPr marL="0" marR="0" lvl="0" indent="0" algn="ctr" rtl="0">
-              <a:spcBef>
-                <a:spcPts val="0"/>
-              </a:spcBef>
-              <a:spcAft>
-                <a:spcPts val="0"/>
-              </a:spcAft>
-              <a:buClr>
-                <a:schemeClr val="lt1"/>
-              </a:buClr>
-              <a:buSzPts val="1200"/>
-              <a:buFont typeface="Arial"/>
-              <a:buNone/>
-            </a:pPr>
-            <a:r>
-              <a:rPr lang="en-US" sz="1500" b="1" i="0" strike="noStrike" cap="none">
-                <a:solidFill>
-                  <a:srgbClr val="262626"/>
-                </a:solidFill>
-                <a:latin typeface="Roboto"/>
-                <a:ea typeface="Roboto"/>
-                <a:cs typeface="Roboto"/>
-                <a:sym typeface="Roboto"/>
-              </a:rPr>
-              <a:t>www.itea.ua</a:t>
-            </a:r>
-            <a:endParaRPr sz="1500" b="1" i="0" strike="noStrike" cap="none">
-              <a:solidFill>
-                <a:srgbClr val="262626"/>
-              </a:solidFill>
-              <a:latin typeface="Roboto"/>
-              <a:ea typeface="Roboto"/>
-              <a:cs typeface="Roboto"/>
-              <a:sym typeface="Roboto"/>
-            </a:endParaRPr>
-          </a:p>
-        </p:txBody>
-      </p:sp>
-      <p:sp>
-        <p:nvSpPr>
-          <p:cNvPr id="160" name="Shape 160"/>
-          <p:cNvSpPr/>
-          <p:nvPr/>
-        </p:nvSpPr>
-        <p:spPr>
-          <a:xfrm rot="10800000" flipH="1">
-            <a:off x="0" y="1127850"/>
-            <a:ext cx="3143100" cy="42300"/>
-          </a:xfrm>
-          <a:prstGeom prst="rect">
-            <a:avLst/>
-          </a:prstGeom>
-          <a:solidFill>
-            <a:srgbClr val="CC0000"/>
-          </a:solidFill>
-          <a:ln>
-            <a:noFill/>
-          </a:ln>
-        </p:spPr>
-        <p:txBody>
-          <a:bodyPr spcFirstLastPara="1" wrap="square" lIns="91425" tIns="91425" rIns="91425" bIns="91425" anchor="ctr" anchorCtr="0">
-            <a:noAutofit/>
-          </a:bodyPr>
-          <a:lstStyle/>
-          <a:p>
-            <a:pPr marL="0" lvl="0" indent="0">
-              <a:spcBef>
-                <a:spcPts val="0"/>
-              </a:spcBef>
-              <a:spcAft>
-                <a:spcPts val="0"/>
-              </a:spcAft>
-              <a:buNone/>
-            </a:pPr>
-            <a:r>
-              <a:rPr lang="en-US"/>
-              <a:t>                                                                                     </a:t>
-            </a:r>
-            <a:endParaRPr/>
-          </a:p>
-        </p:txBody>
-      </p:sp>
-      <p:sp>
-        <p:nvSpPr>
-          <p:cNvPr id="161" name="Shape 161"/>
-          <p:cNvSpPr/>
-          <p:nvPr/>
-        </p:nvSpPr>
-        <p:spPr>
-          <a:xfrm rot="10800000" flipH="1">
-            <a:off x="3067050" y="1127850"/>
-            <a:ext cx="3143100" cy="42300"/>
-          </a:xfrm>
-          <a:prstGeom prst="rect">
-            <a:avLst/>
-          </a:prstGeom>
-          <a:solidFill>
-            <a:srgbClr val="262626"/>
-          </a:solidFill>
-          <a:ln>
-            <a:noFill/>
-          </a:ln>
-        </p:spPr>
-        <p:txBody>
-          <a:bodyPr spcFirstLastPara="1" wrap="square" lIns="91425" tIns="91425" rIns="91425" bIns="91425" anchor="ctr" anchorCtr="0">
-            <a:noAutofit/>
-          </a:bodyPr>
-          <a:lstStyle/>
-          <a:p>
-            <a:pPr marL="0" lvl="0" indent="0">
-              <a:spcBef>
-                <a:spcPts val="0"/>
-              </a:spcBef>
-              <a:spcAft>
-                <a:spcPts val="0"/>
-              </a:spcAft>
-              <a:buNone/>
-            </a:pPr>
-            <a:endParaRPr/>
-          </a:p>
-        </p:txBody>
-      </p:sp>
-      <p:pic>
-        <p:nvPicPr>
-          <p:cNvPr id="162" name="Shape 162"/>
-          <p:cNvPicPr preferRelativeResize="0"/>
-          <p:nvPr/>
-        </p:nvPicPr>
-        <p:blipFill>
-          <a:blip r:embed="rId3">
-            <a:alphaModFix/>
-          </a:blip>
-          <a:stretch>
-            <a:fillRect/>
-          </a:stretch>
-        </p:blipFill>
-        <p:spPr>
-          <a:xfrm>
-            <a:off x="353700" y="302000"/>
-            <a:ext cx="1741800" cy="502875"/>
-          </a:xfrm>
-          <a:prstGeom prst="rect">
-            <a:avLst/>
-          </a:prstGeom>
-          <a:noFill/>
-          <a:ln>
-            <a:noFill/>
-          </a:ln>
-        </p:spPr>
-      </p:pic>
-      <p:pic>
-        <p:nvPicPr>
-          <p:cNvPr id="1026" name="Picture 2" descr="GitHub - hontas/bowling-game-kata: Uncle Bob's Bowling Game Kata in  JavaScript using Karma, Mocha and Chai">
-            <a:extLst>
-              <a:ext uri="{FF2B5EF4-FFF2-40B4-BE49-F238E27FC236}">
-                <a16:creationId xmlns:a16="http://schemas.microsoft.com/office/drawing/2014/main" id="{BB8B07B5-1158-40D5-B5C8-8CF31C5D3577}"/>
-              </a:ext>
-            </a:extLst>
-          </p:cNvPr>
-          <p:cNvPicPr>
-            <a:picLocks noChangeAspect="1" noChangeArrowheads="1"/>
-          </p:cNvPicPr>
-          <p:nvPr/>
-        </p:nvPicPr>
-        <p:blipFill>
-          <a:blip r:embed="rId4">
-            <a:extLst>
-              <a:ext uri="{28A0092B-C50C-407E-A947-70E740481C1C}">
-                <a14:useLocalDpi xmlns:a14="http://schemas.microsoft.com/office/drawing/2010/main" val="0"/>
-              </a:ext>
-            </a:extLst>
-          </a:blip>
-          <a:srcRect/>
-          <a:stretch>
-            <a:fillRect/>
-          </a:stretch>
-        </p:blipFill>
-        <p:spPr bwMode="auto">
-          <a:xfrm>
-            <a:off x="53266" y="5362663"/>
-            <a:ext cx="9037468" cy="1173616"/>
-          </a:xfrm>
-          <a:prstGeom prst="rect">
-            <a:avLst/>
-          </a:prstGeom>
-          <a:noFill/>
-          <a:extLst>
-            <a:ext uri="{909E8E84-426E-40DD-AFC4-6F175D3DCCD1}">
-              <a14:hiddenFill xmlns:a14="http://schemas.microsoft.com/office/drawing/2010/main">
-                <a:solidFill>
-                  <a:srgbClr val="FFFFFF"/>
-                </a:solidFill>
-              </a14:hiddenFill>
-            </a:ext>
-          </a:extLst>
-        </p:spPr>
-      </p:pic>
-      <p:sp>
-        <p:nvSpPr>
-          <p:cNvPr id="9" name="Shape 163">
-            <a:extLst>
-              <a:ext uri="{FF2B5EF4-FFF2-40B4-BE49-F238E27FC236}">
-                <a16:creationId xmlns:a16="http://schemas.microsoft.com/office/drawing/2014/main" id="{B8D05A87-8A10-492F-AD74-0C93BD6D5053}"/>
-              </a:ext>
-            </a:extLst>
-          </p:cNvPr>
-          <p:cNvSpPr txBox="1"/>
-          <p:nvPr/>
-        </p:nvSpPr>
-        <p:spPr>
-          <a:xfrm>
-            <a:off x="353700" y="2166152"/>
-            <a:ext cx="8181300" cy="2032986"/>
-          </a:xfrm>
-          <a:prstGeom prst="rect">
-            <a:avLst/>
-          </a:prstGeom>
-          <a:noFill/>
-          <a:ln>
-            <a:noFill/>
-          </a:ln>
-        </p:spPr>
-        <p:txBody>
-          <a:bodyPr spcFirstLastPara="1" wrap="square" lIns="91425" tIns="45700" rIns="91425" bIns="45700" anchor="ctr" anchorCtr="0">
-            <a:noAutofit/>
-          </a:bodyPr>
-          <a:lstStyle/>
-          <a:p>
-            <a:pPr lvl="0">
-              <a:spcAft>
-                <a:spcPts val="2500"/>
-              </a:spcAft>
-              <a:buSzPts val="2000"/>
-            </a:pPr>
-            <a:r>
-              <a:rPr lang="ru-RU" sz="2000" dirty="0">
-                <a:solidFill>
-                  <a:srgbClr val="262626"/>
-                </a:solidFill>
-                <a:latin typeface="Roboto"/>
-                <a:ea typeface="Roboto"/>
-                <a:cs typeface="Roboto"/>
-                <a:sym typeface="Roboto"/>
-              </a:rPr>
-              <a:t>Руководствуясь методикой </a:t>
-            </a:r>
-            <a:r>
-              <a:rPr lang="en-US" sz="2000" dirty="0">
-                <a:solidFill>
-                  <a:srgbClr val="262626"/>
-                </a:solidFill>
-                <a:latin typeface="Roboto"/>
-                <a:ea typeface="Roboto"/>
-                <a:cs typeface="Roboto"/>
-                <a:sym typeface="Roboto"/>
-              </a:rPr>
-              <a:t>TDD</a:t>
-            </a:r>
-            <a:r>
-              <a:rPr lang="ru-RU" sz="2000" dirty="0">
-                <a:solidFill>
-                  <a:srgbClr val="262626"/>
-                </a:solidFill>
-                <a:latin typeface="Roboto"/>
-                <a:ea typeface="Roboto"/>
-                <a:cs typeface="Roboto"/>
-                <a:sym typeface="Roboto"/>
-              </a:rPr>
-              <a:t>,</a:t>
-            </a:r>
-            <a:r>
-              <a:rPr lang="en-US" sz="2000" dirty="0">
-                <a:solidFill>
-                  <a:srgbClr val="262626"/>
-                </a:solidFill>
-                <a:latin typeface="Roboto"/>
-                <a:ea typeface="Roboto"/>
-                <a:cs typeface="Roboto"/>
-                <a:sym typeface="Roboto"/>
-              </a:rPr>
-              <a:t> </a:t>
-            </a:r>
-            <a:r>
-              <a:rPr lang="ru-RU" sz="2000" dirty="0">
-                <a:solidFill>
-                  <a:srgbClr val="262626"/>
-                </a:solidFill>
-                <a:latin typeface="Roboto"/>
-                <a:ea typeface="Roboto"/>
-                <a:cs typeface="Roboto"/>
-                <a:sym typeface="Roboto"/>
-              </a:rPr>
-              <a:t>мы создадим симулятор игры в боулинг.</a:t>
-            </a:r>
-          </a:p>
-          <a:p>
-            <a:pPr lvl="0">
-              <a:spcAft>
-                <a:spcPts val="2500"/>
-              </a:spcAft>
-              <a:buSzPts val="2000"/>
-            </a:pPr>
-            <a:r>
-              <a:rPr lang="ru-RU" sz="2000" dirty="0">
-                <a:solidFill>
-                  <a:srgbClr val="262626"/>
-                </a:solidFill>
-                <a:latin typeface="Roboto"/>
-                <a:ea typeface="Roboto"/>
-                <a:cs typeface="Roboto"/>
-                <a:sym typeface="Roboto"/>
-              </a:rPr>
-              <a:t>Наш основной класс </a:t>
-            </a:r>
-            <a:r>
-              <a:rPr lang="en-US" sz="2000" dirty="0">
-                <a:solidFill>
-                  <a:srgbClr val="262626"/>
-                </a:solidFill>
-                <a:latin typeface="Roboto"/>
-                <a:ea typeface="Roboto"/>
-                <a:cs typeface="Roboto"/>
-                <a:sym typeface="Roboto"/>
-              </a:rPr>
-              <a:t>(Game), </a:t>
-            </a:r>
-            <a:r>
-              <a:rPr lang="ru-RU" sz="2000" dirty="0">
-                <a:solidFill>
-                  <a:srgbClr val="262626"/>
-                </a:solidFill>
-                <a:latin typeface="Roboto"/>
-                <a:ea typeface="Roboto"/>
-                <a:cs typeface="Roboto"/>
-                <a:sym typeface="Roboto"/>
-              </a:rPr>
-              <a:t>будет состоять всего из двух методов: </a:t>
-            </a:r>
-            <a:r>
-              <a:rPr lang="en-US" sz="2000" dirty="0">
-                <a:solidFill>
-                  <a:srgbClr val="262626"/>
-                </a:solidFill>
-                <a:latin typeface="Roboto"/>
-                <a:ea typeface="Roboto"/>
-                <a:cs typeface="Roboto"/>
-                <a:sym typeface="Roboto"/>
-              </a:rPr>
-              <a:t>Roll(int pins), Score().</a:t>
-            </a:r>
-          </a:p>
-        </p:txBody>
-      </p:sp>
-      <p:sp>
-        <p:nvSpPr>
-          <p:cNvPr id="10" name="Shape 163">
-            <a:extLst>
-              <a:ext uri="{FF2B5EF4-FFF2-40B4-BE49-F238E27FC236}">
-                <a16:creationId xmlns:a16="http://schemas.microsoft.com/office/drawing/2014/main" id="{A68F1EA5-40D9-4E1C-9206-799111C747D8}"/>
-              </a:ext>
-            </a:extLst>
-          </p:cNvPr>
-          <p:cNvSpPr txBox="1"/>
-          <p:nvPr/>
-        </p:nvSpPr>
-        <p:spPr>
-          <a:xfrm>
-            <a:off x="353700" y="4672199"/>
-            <a:ext cx="8181300" cy="567087"/>
-          </a:xfrm>
-          <a:prstGeom prst="rect">
-            <a:avLst/>
-          </a:prstGeom>
-          <a:noFill/>
-          <a:ln>
-            <a:noFill/>
-          </a:ln>
-        </p:spPr>
-        <p:txBody>
-          <a:bodyPr spcFirstLastPara="1" wrap="square" lIns="91425" tIns="45700" rIns="91425" bIns="45700" anchor="ctr" anchorCtr="0">
-            <a:noAutofit/>
-          </a:bodyPr>
-          <a:lstStyle/>
-          <a:p>
-            <a:pPr lvl="0">
-              <a:spcAft>
-                <a:spcPts val="2500"/>
-              </a:spcAft>
-              <a:buSzPts val="2000"/>
-            </a:pPr>
-            <a:r>
-              <a:rPr lang="ru-RU" sz="2000" dirty="0">
-                <a:solidFill>
-                  <a:srgbClr val="262626"/>
-                </a:solidFill>
-                <a:latin typeface="Roboto"/>
-                <a:ea typeface="Roboto"/>
-                <a:cs typeface="Roboto"/>
-                <a:sym typeface="Roboto"/>
-              </a:rPr>
-              <a:t>Пример счета в боулинге: </a:t>
-            </a:r>
-            <a:endParaRPr lang="en-US" sz="2000" dirty="0">
-              <a:solidFill>
-                <a:srgbClr val="262626"/>
-              </a:solidFill>
-              <a:latin typeface="Roboto"/>
-              <a:ea typeface="Roboto"/>
-              <a:cs typeface="Roboto"/>
-              <a:sym typeface="Roboto"/>
-            </a:endParaRPr>
-          </a:p>
-        </p:txBody>
-      </p:sp>
-    </p:spTree>
-    <p:extLst>
-      <p:ext uri="{BB962C8B-B14F-4D97-AF65-F5344CB8AC3E}">
-        <p14:creationId xmlns:p14="http://schemas.microsoft.com/office/powerpoint/2010/main" val="962970464"/>
       </p:ext>
     </p:extLst>
   </p:cSld>

</xml_diff>